<commit_message>
Rendering final lighting pass as green on the viper.
</commit_message>
<xml_diff>
--- a/6020_Graph_2_(2025)/Day2Day/Week_08_Deferred_Rendering_1/Deferred_lighting.pptx
+++ b/6020_Graph_2_(2025)/Day2Day/Week_08_Deferred_Rendering_1/Deferred_lighting.pptx
@@ -5,7 +5,7 @@
     <p:sldMasterId id="2147483732" r:id="rId1"/>
   </p:sldMasterIdLst>
   <p:notesMasterIdLst>
-    <p:notesMasterId r:id="rId14"/>
+    <p:notesMasterId r:id="rId17"/>
   </p:notesMasterIdLst>
   <p:sldIdLst>
     <p:sldId id="460" r:id="rId2"/>
@@ -20,6 +20,9 @@
     <p:sldId id="469" r:id="rId11"/>
     <p:sldId id="470" r:id="rId12"/>
     <p:sldId id="471" r:id="rId13"/>
+    <p:sldId id="472" r:id="rId14"/>
+    <p:sldId id="473" r:id="rId15"/>
+    <p:sldId id="475" r:id="rId16"/>
   </p:sldIdLst>
   <p:sldSz cx="9144000" cy="5143500" type="screen16x9"/>
   <p:notesSz cx="7315200" cy="9601200"/>
@@ -234,7 +237,7 @@
             <a:fld id="{C796373C-ADE7-4794-A5C6-CF8090C1CBE1}" type="datetimeFigureOut">
               <a:rPr lang="en-CA" smtClean="0"/>
               <a:pPr/>
-              <a:t>2025-03-11</a:t>
+              <a:t>2025-03-17</a:t>
             </a:fld>
             <a:endParaRPr lang="en-CA"/>
           </a:p>
@@ -745,7 +748,7 @@
             <a:fld id="{1D8BD707-D9CF-40AE-B4C6-C98DA3205C09}" type="datetimeFigureOut">
               <a:rPr lang="en-US" smtClean="0"/>
               <a:pPr/>
-              <a:t>3/11/2025</a:t>
+              <a:t>3/17/2025</a:t>
             </a:fld>
             <a:endParaRPr lang="en-US"/>
           </a:p>
@@ -967,7 +970,7 @@
             <a:fld id="{1D8BD707-D9CF-40AE-B4C6-C98DA3205C09}" type="datetimeFigureOut">
               <a:rPr lang="en-US" smtClean="0"/>
               <a:pPr/>
-              <a:t>3/11/2025</a:t>
+              <a:t>3/17/2025</a:t>
             </a:fld>
             <a:endParaRPr lang="en-US"/>
           </a:p>
@@ -1240,7 +1243,7 @@
             <a:fld id="{1D8BD707-D9CF-40AE-B4C6-C98DA3205C09}" type="datetimeFigureOut">
               <a:rPr lang="en-US" smtClean="0"/>
               <a:pPr/>
-              <a:t>3/11/2025</a:t>
+              <a:t>3/17/2025</a:t>
             </a:fld>
             <a:endParaRPr lang="en-US"/>
           </a:p>
@@ -1416,7 +1419,7 @@
             <a:fld id="{409CD64F-A5A1-4F21-A75E-AF65C33CA0D3}" type="datetimeFigureOut">
               <a:rPr lang="en-CA" smtClean="0"/>
               <a:pPr/>
-              <a:t>2025-03-11</a:t>
+              <a:t>2025-03-17</a:t>
             </a:fld>
             <a:endParaRPr lang="en-CA"/>
           </a:p>
@@ -1771,7 +1774,7 @@
             <a:fld id="{1D8BD707-D9CF-40AE-B4C6-C98DA3205C09}" type="datetimeFigureOut">
               <a:rPr lang="en-US" smtClean="0"/>
               <a:pPr/>
-              <a:t>3/11/2025</a:t>
+              <a:t>3/17/2025</a:t>
             </a:fld>
             <a:endParaRPr lang="en-US"/>
           </a:p>
@@ -2057,7 +2060,7 @@
             <a:fld id="{1D8BD707-D9CF-40AE-B4C6-C98DA3205C09}" type="datetimeFigureOut">
               <a:rPr lang="en-US" smtClean="0"/>
               <a:pPr/>
-              <a:t>3/11/2025</a:t>
+              <a:t>3/17/2025</a:t>
             </a:fld>
             <a:endParaRPr lang="en-US"/>
           </a:p>
@@ -2480,7 +2483,7 @@
             <a:fld id="{1D8BD707-D9CF-40AE-B4C6-C98DA3205C09}" type="datetimeFigureOut">
               <a:rPr lang="en-US" smtClean="0"/>
               <a:pPr/>
-              <a:t>3/11/2025</a:t>
+              <a:t>3/17/2025</a:t>
             </a:fld>
             <a:endParaRPr lang="en-US"/>
           </a:p>
@@ -2594,7 +2597,7 @@
             <a:fld id="{1D8BD707-D9CF-40AE-B4C6-C98DA3205C09}" type="datetimeFigureOut">
               <a:rPr lang="en-US" smtClean="0"/>
               <a:pPr/>
-              <a:t>3/11/2025</a:t>
+              <a:t>3/17/2025</a:t>
             </a:fld>
             <a:endParaRPr lang="en-US"/>
           </a:p>
@@ -2686,7 +2689,7 @@
             <a:fld id="{1D8BD707-D9CF-40AE-B4C6-C98DA3205C09}" type="datetimeFigureOut">
               <a:rPr lang="en-US" smtClean="0"/>
               <a:pPr/>
-              <a:t>3/11/2025</a:t>
+              <a:t>3/17/2025</a:t>
             </a:fld>
             <a:endParaRPr lang="en-US"/>
           </a:p>
@@ -2965,7 +2968,7 @@
             <a:fld id="{1D8BD707-D9CF-40AE-B4C6-C98DA3205C09}" type="datetimeFigureOut">
               <a:rPr lang="en-US" smtClean="0"/>
               <a:pPr/>
-              <a:t>3/11/2025</a:t>
+              <a:t>3/17/2025</a:t>
             </a:fld>
             <a:endParaRPr lang="en-US"/>
           </a:p>
@@ -3328,7 +3331,7 @@
             <a:fld id="{1D8BD707-D9CF-40AE-B4C6-C98DA3205C09}" type="datetimeFigureOut">
               <a:rPr lang="en-US" smtClean="0"/>
               <a:pPr/>
-              <a:t>3/11/2025</a:t>
+              <a:t>3/17/2025</a:t>
             </a:fld>
             <a:endParaRPr lang="en-US"/>
           </a:p>
@@ -3753,7 +3756,7 @@
             <a:fld id="{1D8BD707-D9CF-40AE-B4C6-C98DA3205C09}" type="datetimeFigureOut">
               <a:rPr lang="en-US" smtClean="0"/>
               <a:pPr/>
-              <a:t>3/11/2025</a:t>
+              <a:t>3/17/2025</a:t>
             </a:fld>
             <a:endParaRPr lang="en-US"/>
           </a:p>
@@ -4497,7 +4500,7 @@
           <a:p>
             <a:r>
               <a:rPr lang="en-CA" dirty="0"/>
-              <a:t>So, what do we do?</a:t>
+              <a:t>So, what are WE doing?</a:t>
             </a:r>
           </a:p>
         </p:txBody>
@@ -4591,6 +4594,816 @@
     <p:extLst>
       <p:ext uri="{BB962C8B-B14F-4D97-AF65-F5344CB8AC3E}">
         <p14:creationId xmlns:p14="http://schemas.microsoft.com/office/powerpoint/2010/main" val="1772658286"/>
+      </p:ext>
+    </p:extLst>
+  </p:cSld>
+  <p:clrMapOvr>
+    <a:masterClrMapping/>
+  </p:clrMapOvr>
+</p:sld>
+</file>
+
+<file path=ppt/slides/slide13.xml><?xml version="1.0" encoding="utf-8"?>
+<p:sld xmlns:a="http://schemas.openxmlformats.org/drawingml/2006/main" xmlns:r="http://schemas.openxmlformats.org/officeDocument/2006/relationships" xmlns:p="http://schemas.openxmlformats.org/presentationml/2006/main">
+  <p:cSld>
+    <p:spTree>
+      <p:nvGrpSpPr>
+        <p:cNvPr id="1" name="">
+          <a:extLst>
+            <a:ext uri="{FF2B5EF4-FFF2-40B4-BE49-F238E27FC236}">
+              <a16:creationId xmlns:a16="http://schemas.microsoft.com/office/drawing/2014/main" id="{F5885640-0156-3D7B-4671-C4FBD576769C}"/>
+            </a:ext>
+          </a:extLst>
+        </p:cNvPr>
+        <p:cNvGrpSpPr/>
+        <p:nvPr/>
+      </p:nvGrpSpPr>
+      <p:grpSpPr>
+        <a:xfrm>
+          <a:off x="0" y="0"/>
+          <a:ext cx="0" cy="0"/>
+          <a:chOff x="0" y="0"/>
+          <a:chExt cx="0" cy="0"/>
+        </a:xfrm>
+      </p:grpSpPr>
+      <p:sp>
+        <p:nvSpPr>
+          <p:cNvPr id="2" name="Title 1">
+            <a:extLst>
+              <a:ext uri="{FF2B5EF4-FFF2-40B4-BE49-F238E27FC236}">
+                <a16:creationId xmlns:a16="http://schemas.microsoft.com/office/drawing/2014/main" id="{536D781F-1333-FC0E-3BB7-C7AB7EE59A6A}"/>
+              </a:ext>
+            </a:extLst>
+          </p:cNvPr>
+          <p:cNvSpPr>
+            <a:spLocks noGrp="1"/>
+          </p:cNvSpPr>
+          <p:nvPr>
+            <p:ph type="title"/>
+          </p:nvPr>
+        </p:nvSpPr>
+        <p:spPr/>
+        <p:txBody>
+          <a:bodyPr/>
+          <a:lstStyle/>
+          <a:p>
+            <a:r>
+              <a:rPr lang="en-CA" dirty="0"/>
+              <a:t>Our G buffer:</a:t>
+            </a:r>
+          </a:p>
+        </p:txBody>
+      </p:sp>
+      <p:graphicFrame>
+        <p:nvGraphicFramePr>
+          <p:cNvPr id="8" name="Object 7">
+            <a:extLst>
+              <a:ext uri="{FF2B5EF4-FFF2-40B4-BE49-F238E27FC236}">
+                <a16:creationId xmlns:a16="http://schemas.microsoft.com/office/drawing/2014/main" id="{F8EAC111-A4E7-A72B-5B07-9B11F46EE719}"/>
+              </a:ext>
+            </a:extLst>
+          </p:cNvPr>
+          <p:cNvGraphicFramePr>
+            <a:graphicFrameLocks noChangeAspect="1"/>
+          </p:cNvGraphicFramePr>
+          <p:nvPr>
+            <p:extLst>
+              <p:ext uri="{D42A27DB-BD31-4B8C-83A1-F6EECF244321}">
+                <p14:modId xmlns:p14="http://schemas.microsoft.com/office/powerpoint/2010/main" val="822255029"/>
+              </p:ext>
+            </p:extLst>
+          </p:nvPr>
+        </p:nvGraphicFramePr>
+        <p:xfrm>
+          <a:off x="762000" y="1809750"/>
+          <a:ext cx="7974013" cy="2020888"/>
+        </p:xfrm>
+        <a:graphic>
+          <a:graphicData uri="http://schemas.openxmlformats.org/presentationml/2006/ole">
+            <mc:AlternateContent xmlns:mc="http://schemas.openxmlformats.org/markup-compatibility/2006">
+              <mc:Choice xmlns:v="urn:schemas-microsoft-com:vml" Requires="v">
+                <p:oleObj name="Worksheet" r:id="rId2" imgW="4358498" imgH="1105057" progId="Excel.Sheet.12">
+                  <p:embed/>
+                </p:oleObj>
+              </mc:Choice>
+              <mc:Fallback>
+                <p:oleObj name="Worksheet" r:id="rId2" imgW="4358498" imgH="1105057" progId="Excel.Sheet.12">
+                  <p:embed/>
+                  <p:pic>
+                    <p:nvPicPr>
+                      <p:cNvPr id="0" name=""/>
+                      <p:cNvPicPr/>
+                      <p:nvPr/>
+                    </p:nvPicPr>
+                    <p:blipFill>
+                      <a:blip r:embed="rId3"/>
+                      <a:stretch>
+                        <a:fillRect/>
+                      </a:stretch>
+                    </p:blipFill>
+                    <p:spPr>
+                      <a:xfrm>
+                        <a:off x="762000" y="1809750"/>
+                        <a:ext cx="7974013" cy="2020888"/>
+                      </a:xfrm>
+                      <a:prstGeom prst="rect">
+                        <a:avLst/>
+                      </a:prstGeom>
+                    </p:spPr>
+                  </p:pic>
+                </p:oleObj>
+              </mc:Fallback>
+            </mc:AlternateContent>
+          </a:graphicData>
+        </a:graphic>
+      </p:graphicFrame>
+    </p:spTree>
+    <p:extLst>
+      <p:ext uri="{BB962C8B-B14F-4D97-AF65-F5344CB8AC3E}">
+        <p14:creationId xmlns:p14="http://schemas.microsoft.com/office/powerpoint/2010/main" val="3075913534"/>
+      </p:ext>
+    </p:extLst>
+  </p:cSld>
+  <p:clrMapOvr>
+    <a:masterClrMapping/>
+  </p:clrMapOvr>
+</p:sld>
+</file>
+
+<file path=ppt/slides/slide14.xml><?xml version="1.0" encoding="utf-8"?>
+<p:sld xmlns:a="http://schemas.openxmlformats.org/drawingml/2006/main" xmlns:r="http://schemas.openxmlformats.org/officeDocument/2006/relationships" xmlns:p="http://schemas.openxmlformats.org/presentationml/2006/main">
+  <p:cSld>
+    <p:spTree>
+      <p:nvGrpSpPr>
+        <p:cNvPr id="1" name=""/>
+        <p:cNvGrpSpPr/>
+        <p:nvPr/>
+      </p:nvGrpSpPr>
+      <p:grpSpPr>
+        <a:xfrm>
+          <a:off x="0" y="0"/>
+          <a:ext cx="0" cy="0"/>
+          <a:chOff x="0" y="0"/>
+          <a:chExt cx="0" cy="0"/>
+        </a:xfrm>
+      </p:grpSpPr>
+      <p:sp>
+        <p:nvSpPr>
+          <p:cNvPr id="2" name="Title 1">
+            <a:extLst>
+              <a:ext uri="{FF2B5EF4-FFF2-40B4-BE49-F238E27FC236}">
+                <a16:creationId xmlns:a16="http://schemas.microsoft.com/office/drawing/2014/main" id="{7D420759-A2D4-72C0-837F-9665A1882570}"/>
+              </a:ext>
+            </a:extLst>
+          </p:cNvPr>
+          <p:cNvSpPr>
+            <a:spLocks noGrp="1"/>
+          </p:cNvSpPr>
+          <p:nvPr>
+            <p:ph type="title"/>
+          </p:nvPr>
+        </p:nvSpPr>
+        <p:spPr/>
+        <p:txBody>
+          <a:bodyPr/>
+          <a:lstStyle/>
+          <a:p>
+            <a:r>
+              <a:rPr lang="en-CA" dirty="0"/>
+              <a:t>The “</a:t>
+            </a:r>
+            <a:r>
+              <a:rPr lang="en-CA" dirty="0" err="1"/>
+              <a:t>renderPassNumber</a:t>
+            </a:r>
+            <a:r>
+              <a:rPr lang="en-CA" dirty="0"/>
+              <a:t>”	</a:t>
+            </a:r>
+          </a:p>
+        </p:txBody>
+      </p:sp>
+      <p:sp>
+        <p:nvSpPr>
+          <p:cNvPr id="3" name="Content Placeholder 2">
+            <a:extLst>
+              <a:ext uri="{FF2B5EF4-FFF2-40B4-BE49-F238E27FC236}">
+                <a16:creationId xmlns:a16="http://schemas.microsoft.com/office/drawing/2014/main" id="{0AF4EE83-5030-97B3-86A9-A9A2DD4184E6}"/>
+              </a:ext>
+            </a:extLst>
+          </p:cNvPr>
+          <p:cNvSpPr>
+            <a:spLocks noGrp="1"/>
+          </p:cNvSpPr>
+          <p:nvPr>
+            <p:ph idx="1"/>
+          </p:nvPr>
+        </p:nvSpPr>
+        <p:spPr>
+          <a:xfrm>
+            <a:off x="266700" y="1200150"/>
+            <a:ext cx="8610600" cy="3657600"/>
+          </a:xfrm>
+        </p:spPr>
+        <p:txBody>
+          <a:bodyPr>
+            <a:noAutofit/>
+          </a:bodyPr>
+          <a:lstStyle/>
+          <a:p>
+            <a:r>
+              <a:rPr lang="en-CA" sz="2000" dirty="0">
+                <a:latin typeface="Arial" panose="020B0604020202020204" pitchFamily="34" charset="0"/>
+                <a:cs typeface="Arial" panose="020B0604020202020204" pitchFamily="34" charset="0"/>
+              </a:rPr>
+              <a:t>We only output the things to the G buffer</a:t>
+            </a:r>
+          </a:p>
+          <a:p>
+            <a:r>
+              <a:rPr lang="en-CA" sz="2000" dirty="0">
+                <a:latin typeface="Arial" panose="020B0604020202020204" pitchFamily="34" charset="0"/>
+                <a:cs typeface="Arial" panose="020B0604020202020204" pitchFamily="34" charset="0"/>
+              </a:rPr>
+              <a:t>We don’t output any lighting information here</a:t>
+            </a:r>
+          </a:p>
+          <a:p>
+            <a:r>
+              <a:rPr lang="en-CA" sz="2000" dirty="0">
+                <a:latin typeface="Arial" panose="020B0604020202020204" pitchFamily="34" charset="0"/>
+                <a:cs typeface="Arial" panose="020B0604020202020204" pitchFamily="34" charset="0"/>
+              </a:rPr>
+              <a:t>This means you’re 1</a:t>
+            </a:r>
+            <a:r>
+              <a:rPr lang="en-CA" sz="2000" baseline="30000" dirty="0">
+                <a:latin typeface="Arial" panose="020B0604020202020204" pitchFamily="34" charset="0"/>
+                <a:cs typeface="Arial" panose="020B0604020202020204" pitchFamily="34" charset="0"/>
+              </a:rPr>
+              <a:t>st</a:t>
+            </a:r>
+            <a:r>
+              <a:rPr lang="en-CA" sz="2000" dirty="0">
+                <a:latin typeface="Arial" panose="020B0604020202020204" pitchFamily="34" charset="0"/>
+                <a:cs typeface="Arial" panose="020B0604020202020204" pitchFamily="34" charset="0"/>
+              </a:rPr>
+              <a:t> pass is likely a simpler sort of shader</a:t>
+            </a:r>
+          </a:p>
+          <a:p>
+            <a:r>
+              <a:rPr lang="en-CA" sz="2000" dirty="0">
+                <a:latin typeface="Arial" panose="020B0604020202020204" pitchFamily="34" charset="0"/>
+                <a:cs typeface="Arial" panose="020B0604020202020204" pitchFamily="34" charset="0"/>
+              </a:rPr>
+              <a:t>We are using the uniform int </a:t>
+            </a:r>
+            <a:r>
+              <a:rPr lang="en-CA" sz="2000" dirty="0" err="1">
+                <a:latin typeface="Arial" panose="020B0604020202020204" pitchFamily="34" charset="0"/>
+                <a:cs typeface="Arial" panose="020B0604020202020204" pitchFamily="34" charset="0"/>
+              </a:rPr>
+              <a:t>renderPassNumber</a:t>
+            </a:r>
+            <a:r>
+              <a:rPr lang="en-CA" sz="2000" dirty="0">
+                <a:latin typeface="Arial" panose="020B0604020202020204" pitchFamily="34" charset="0"/>
+                <a:cs typeface="Arial" panose="020B0604020202020204" pitchFamily="34" charset="0"/>
+              </a:rPr>
+              <a:t> to indicate which “pass” we are doing:</a:t>
+            </a:r>
+          </a:p>
+          <a:p>
+            <a:pPr marL="704088" lvl="2" indent="-320040">
+              <a:spcBef>
+                <a:spcPts val="0"/>
+              </a:spcBef>
+              <a:buClr>
+                <a:schemeClr val="accent1"/>
+              </a:buClr>
+              <a:buSzPct val="80000"/>
+              <a:buFont typeface="Wingdings 2"/>
+              <a:buChar char=""/>
+            </a:pPr>
+            <a:r>
+              <a:rPr lang="en-CA" sz="1600" dirty="0">
+                <a:latin typeface="Arial" panose="020B0604020202020204" pitchFamily="34" charset="0"/>
+                <a:cs typeface="Arial" panose="020B0604020202020204" pitchFamily="34" charset="0"/>
+              </a:rPr>
+              <a:t>0 : Regular forward rendering (note we had to change our colour output variable from “</a:t>
+            </a:r>
+            <a:r>
+              <a:rPr lang="en-CA" sz="1600" dirty="0" err="1">
+                <a:latin typeface="Arial" panose="020B0604020202020204" pitchFamily="34" charset="0"/>
+                <a:cs typeface="Arial" panose="020B0604020202020204" pitchFamily="34" charset="0"/>
+              </a:rPr>
+              <a:t>finalPixelColour</a:t>
+            </a:r>
+            <a:r>
+              <a:rPr lang="en-CA" sz="1600" dirty="0">
+                <a:latin typeface="Arial" panose="020B0604020202020204" pitchFamily="34" charset="0"/>
+                <a:cs typeface="Arial" panose="020B0604020202020204" pitchFamily="34" charset="0"/>
+              </a:rPr>
+              <a:t>” to “</a:t>
+            </a:r>
+            <a:r>
+              <a:rPr lang="en-CA" sz="1600" dirty="0" err="1">
+                <a:latin typeface="Arial" panose="020B0604020202020204" pitchFamily="34" charset="0"/>
+                <a:cs typeface="Arial" panose="020B0604020202020204" pitchFamily="34" charset="0"/>
+              </a:rPr>
+              <a:t>vertexWorldLocationXYZ</a:t>
+            </a:r>
+            <a:r>
+              <a:rPr lang="en-CA" sz="1600" dirty="0">
+                <a:latin typeface="Arial" panose="020B0604020202020204" pitchFamily="34" charset="0"/>
+                <a:cs typeface="Arial" panose="020B0604020202020204" pitchFamily="34" charset="0"/>
+              </a:rPr>
+              <a:t>” which might be a little confusing. </a:t>
+            </a:r>
+          </a:p>
+          <a:p>
+            <a:pPr marL="923544" lvl="3" indent="-320040">
+              <a:spcBef>
+                <a:spcPts val="0"/>
+              </a:spcBef>
+              <a:buClr>
+                <a:schemeClr val="accent1"/>
+              </a:buClr>
+              <a:buSzPct val="80000"/>
+              <a:buFont typeface="Wingdings 2"/>
+              <a:buChar char=""/>
+            </a:pPr>
+            <a:r>
+              <a:rPr lang="en-CA" sz="1400" dirty="0">
+                <a:latin typeface="Arial" panose="020B0604020202020204" pitchFamily="34" charset="0"/>
+                <a:cs typeface="Arial" panose="020B0604020202020204" pitchFamily="34" charset="0"/>
+              </a:rPr>
+              <a:t>I used “0” (zero) so that if we forgot to set the </a:t>
+            </a:r>
+            <a:r>
+              <a:rPr lang="en-CA" sz="1400" dirty="0" err="1">
+                <a:latin typeface="Arial" panose="020B0604020202020204" pitchFamily="34" charset="0"/>
+                <a:cs typeface="Arial" panose="020B0604020202020204" pitchFamily="34" charset="0"/>
+              </a:rPr>
+              <a:t>renderPassNumber</a:t>
+            </a:r>
+            <a:r>
+              <a:rPr lang="en-CA" sz="1400" dirty="0">
+                <a:latin typeface="Arial" panose="020B0604020202020204" pitchFamily="34" charset="0"/>
+                <a:cs typeface="Arial" panose="020B0604020202020204" pitchFamily="34" charset="0"/>
+              </a:rPr>
+              <a:t> it would still work.</a:t>
+            </a:r>
+          </a:p>
+          <a:p>
+            <a:pPr lvl="1"/>
+            <a:r>
+              <a:rPr lang="en-CA" sz="2000" b="1" dirty="0"/>
+              <a:t>1: 1</a:t>
+            </a:r>
+            <a:r>
+              <a:rPr lang="en-CA" sz="2000" b="1" baseline="30000" dirty="0"/>
+              <a:t>st</a:t>
+            </a:r>
+            <a:r>
+              <a:rPr lang="en-CA" sz="2000" b="1" dirty="0"/>
+              <a:t> pass of the deferred, rending to the G buffer</a:t>
+            </a:r>
+          </a:p>
+          <a:p>
+            <a:pPr lvl="1"/>
+            <a:r>
+              <a:rPr lang="en-CA" sz="2000" dirty="0"/>
+              <a:t>2: Optional 2</a:t>
+            </a:r>
+            <a:r>
+              <a:rPr lang="en-CA" sz="2000" baseline="30000" dirty="0"/>
+              <a:t>nd</a:t>
+            </a:r>
+            <a:r>
+              <a:rPr lang="en-CA" sz="2000" dirty="0"/>
+              <a:t> pass which we </a:t>
+            </a:r>
+            <a:r>
+              <a:rPr lang="en-CA" sz="2000" i="1" dirty="0"/>
+              <a:t>aren’t </a:t>
+            </a:r>
+            <a:r>
+              <a:rPr lang="en-CA" sz="2000" dirty="0"/>
+              <a:t>using at the moment</a:t>
+            </a:r>
+          </a:p>
+          <a:p>
+            <a:pPr lvl="1"/>
+            <a:r>
+              <a:rPr lang="en-CA" sz="2000" b="1" dirty="0"/>
+              <a:t>3: Lighting pass (this can also be the “2</a:t>
+            </a:r>
+            <a:r>
+              <a:rPr lang="en-CA" sz="2000" b="1" baseline="30000" dirty="0"/>
+              <a:t>nd</a:t>
+            </a:r>
+            <a:r>
+              <a:rPr lang="en-CA" sz="2000" b="1" dirty="0"/>
+              <a:t> pass”/”effects” pass, too)</a:t>
+            </a:r>
+          </a:p>
+          <a:p>
+            <a:pPr lvl="2"/>
+            <a:r>
+              <a:rPr lang="en-CA" sz="1600" dirty="0"/>
+              <a:t>This will output to the colour buffer (i.e. the screen)</a:t>
+            </a:r>
+          </a:p>
+        </p:txBody>
+      </p:sp>
+    </p:spTree>
+    <p:extLst>
+      <p:ext uri="{BB962C8B-B14F-4D97-AF65-F5344CB8AC3E}">
+        <p14:creationId xmlns:p14="http://schemas.microsoft.com/office/powerpoint/2010/main" val="244423429"/>
+      </p:ext>
+    </p:extLst>
+  </p:cSld>
+  <p:clrMapOvr>
+    <a:masterClrMapping/>
+  </p:clrMapOvr>
+</p:sld>
+</file>
+
+<file path=ppt/slides/slide15.xml><?xml version="1.0" encoding="utf-8"?>
+<p:sld xmlns:a="http://schemas.openxmlformats.org/drawingml/2006/main" xmlns:r="http://schemas.openxmlformats.org/officeDocument/2006/relationships" xmlns:p="http://schemas.openxmlformats.org/presentationml/2006/main">
+  <p:cSld>
+    <p:spTree>
+      <p:nvGrpSpPr>
+        <p:cNvPr id="1" name=""/>
+        <p:cNvGrpSpPr/>
+        <p:nvPr/>
+      </p:nvGrpSpPr>
+      <p:grpSpPr>
+        <a:xfrm>
+          <a:off x="0" y="0"/>
+          <a:ext cx="0" cy="0"/>
+          <a:chOff x="0" y="0"/>
+          <a:chExt cx="0" cy="0"/>
+        </a:xfrm>
+      </p:grpSpPr>
+      <p:sp>
+        <p:nvSpPr>
+          <p:cNvPr id="2" name="Rectangle 1">
+            <a:extLst>
+              <a:ext uri="{FF2B5EF4-FFF2-40B4-BE49-F238E27FC236}">
+                <a16:creationId xmlns:a16="http://schemas.microsoft.com/office/drawing/2014/main" id="{065C0802-5C7D-6CFA-35C5-F737F9E8CB42}"/>
+              </a:ext>
+            </a:extLst>
+          </p:cNvPr>
+          <p:cNvSpPr/>
+          <p:nvPr/>
+        </p:nvSpPr>
+        <p:spPr>
+          <a:xfrm>
+            <a:off x="3124200" y="285750"/>
+            <a:ext cx="304800" cy="4191000"/>
+          </a:xfrm>
+          <a:prstGeom prst="rect">
+            <a:avLst/>
+          </a:prstGeom>
+        </p:spPr>
+        <p:style>
+          <a:lnRef idx="2">
+            <a:schemeClr val="accent1">
+              <a:shade val="15000"/>
+            </a:schemeClr>
+          </a:lnRef>
+          <a:fillRef idx="1">
+            <a:schemeClr val="accent1"/>
+          </a:fillRef>
+          <a:effectRef idx="0">
+            <a:schemeClr val="accent1"/>
+          </a:effectRef>
+          <a:fontRef idx="minor">
+            <a:schemeClr val="lt1"/>
+          </a:fontRef>
+        </p:style>
+        <p:txBody>
+          <a:bodyPr rtlCol="0" anchor="ctr"/>
+          <a:lstStyle/>
+          <a:p>
+            <a:pPr algn="ctr"/>
+            <a:r>
+              <a:rPr lang="en-CA" dirty="0"/>
+              <a:t>FSQ</a:t>
+            </a:r>
+          </a:p>
+        </p:txBody>
+      </p:sp>
+      <p:sp>
+        <p:nvSpPr>
+          <p:cNvPr id="3" name="Arrow: Right 2">
+            <a:extLst>
+              <a:ext uri="{FF2B5EF4-FFF2-40B4-BE49-F238E27FC236}">
+                <a16:creationId xmlns:a16="http://schemas.microsoft.com/office/drawing/2014/main" id="{169D8390-0D59-FE5A-7872-3B8876BE4BD4}"/>
+              </a:ext>
+            </a:extLst>
+          </p:cNvPr>
+          <p:cNvSpPr/>
+          <p:nvPr/>
+        </p:nvSpPr>
+        <p:spPr>
+          <a:xfrm>
+            <a:off x="533400" y="1733550"/>
+            <a:ext cx="1600200" cy="1219200"/>
+          </a:xfrm>
+          <a:prstGeom prst="rightArrow">
+            <a:avLst>
+              <a:gd name="adj1" fmla="val 59231"/>
+              <a:gd name="adj2" fmla="val 50000"/>
+            </a:avLst>
+          </a:prstGeom>
+        </p:spPr>
+        <p:style>
+          <a:lnRef idx="2">
+            <a:schemeClr val="accent1">
+              <a:shade val="15000"/>
+            </a:schemeClr>
+          </a:lnRef>
+          <a:fillRef idx="1">
+            <a:schemeClr val="accent1"/>
+          </a:fillRef>
+          <a:effectRef idx="0">
+            <a:schemeClr val="accent1"/>
+          </a:effectRef>
+          <a:fontRef idx="minor">
+            <a:schemeClr val="lt1"/>
+          </a:fontRef>
+        </p:style>
+        <p:txBody>
+          <a:bodyPr rtlCol="0" anchor="ctr"/>
+          <a:lstStyle/>
+          <a:p>
+            <a:pPr algn="ctr"/>
+            <a:r>
+              <a:rPr lang="en-CA" dirty="0"/>
+              <a:t>Camera</a:t>
+            </a:r>
+          </a:p>
+          <a:p>
+            <a:pPr algn="ctr"/>
+            <a:r>
+              <a:rPr lang="en-CA" dirty="0"/>
+              <a:t>0, 0, +10</a:t>
+            </a:r>
+          </a:p>
+        </p:txBody>
+      </p:sp>
+      <p:pic>
+        <p:nvPicPr>
+          <p:cNvPr id="1026" name="Picture 2" descr="android - Get OpenGL LookAt Position - Stack Overflow">
+            <a:hlinkClick r:id="rId2"/>
+            <a:extLst>
+              <a:ext uri="{FF2B5EF4-FFF2-40B4-BE49-F238E27FC236}">
+                <a16:creationId xmlns:a16="http://schemas.microsoft.com/office/drawing/2014/main" id="{DFA9C5A4-C5B7-58FB-3371-8FFFDC1CA7D9}"/>
+              </a:ext>
+            </a:extLst>
+          </p:cNvPr>
+          <p:cNvPicPr>
+            <a:picLocks noChangeAspect="1" noChangeArrowheads="1"/>
+          </p:cNvPicPr>
+          <p:nvPr/>
+        </p:nvPicPr>
+        <p:blipFill>
+          <a:blip r:embed="rId3">
+            <a:extLst>
+              <a:ext uri="{28A0092B-C50C-407E-A947-70E740481C1C}">
+                <a14:useLocalDpi xmlns:a14="http://schemas.microsoft.com/office/drawing/2010/main" val="0"/>
+              </a:ext>
+            </a:extLst>
+          </a:blip>
+          <a:srcRect/>
+          <a:stretch>
+            <a:fillRect/>
+          </a:stretch>
+        </p:blipFill>
+        <p:spPr bwMode="auto">
+          <a:xfrm>
+            <a:off x="5791200" y="342900"/>
+            <a:ext cx="3238500" cy="2609850"/>
+          </a:xfrm>
+          <a:prstGeom prst="rect">
+            <a:avLst/>
+          </a:prstGeom>
+          <a:noFill/>
+          <a:extLst>
+            <a:ext uri="{909E8E84-426E-40DD-AFC4-6F175D3DCCD1}">
+              <a14:hiddenFill xmlns:a14="http://schemas.microsoft.com/office/drawing/2010/main">
+                <a:solidFill>
+                  <a:srgbClr val="FFFFFF"/>
+                </a:solidFill>
+              </a14:hiddenFill>
+            </a:ext>
+          </a:extLst>
+        </p:spPr>
+      </p:pic>
+      <p:sp>
+        <p:nvSpPr>
+          <p:cNvPr id="5" name="TextBox 4">
+            <a:extLst>
+              <a:ext uri="{FF2B5EF4-FFF2-40B4-BE49-F238E27FC236}">
+                <a16:creationId xmlns:a16="http://schemas.microsoft.com/office/drawing/2014/main" id="{3679F717-2B6B-A8DF-089D-C77032885A5E}"/>
+              </a:ext>
+            </a:extLst>
+          </p:cNvPr>
+          <p:cNvSpPr txBox="1"/>
+          <p:nvPr/>
+        </p:nvSpPr>
+        <p:spPr>
+          <a:xfrm>
+            <a:off x="3543300" y="2038350"/>
+            <a:ext cx="2019300" cy="1477328"/>
+          </a:xfrm>
+          <a:prstGeom prst="rect">
+            <a:avLst/>
+          </a:prstGeom>
+          <a:noFill/>
+        </p:spPr>
+        <p:txBody>
+          <a:bodyPr wrap="square" rtlCol="0">
+            <a:spAutoFit/>
+          </a:bodyPr>
+          <a:lstStyle/>
+          <a:p>
+            <a:r>
+              <a:rPr lang="en-CA" dirty="0"/>
+              <a:t>Place at the origin (0,0,0)</a:t>
+            </a:r>
+          </a:p>
+          <a:p>
+            <a:r>
+              <a:rPr lang="en-CA" dirty="0"/>
+              <a:t>Lined up on the XY plane, with the centre at 0,0,0</a:t>
+            </a:r>
+          </a:p>
+        </p:txBody>
+      </p:sp>
+      <p:sp>
+        <p:nvSpPr>
+          <p:cNvPr id="8" name="Freeform: Shape 7">
+            <a:extLst>
+              <a:ext uri="{FF2B5EF4-FFF2-40B4-BE49-F238E27FC236}">
+                <a16:creationId xmlns:a16="http://schemas.microsoft.com/office/drawing/2014/main" id="{FBD3D55C-4222-12D7-576B-9B9AA4095B93}"/>
+              </a:ext>
+            </a:extLst>
+          </p:cNvPr>
+          <p:cNvSpPr/>
+          <p:nvPr/>
+        </p:nvSpPr>
+        <p:spPr>
+          <a:xfrm>
+            <a:off x="6622659" y="1016684"/>
+            <a:ext cx="1575582" cy="1364566"/>
+          </a:xfrm>
+          <a:custGeom>
+            <a:avLst/>
+            <a:gdLst>
+              <a:gd name="connsiteX0" fmla="*/ 0 w 1575582"/>
+              <a:gd name="connsiteY0" fmla="*/ 0 h 1364566"/>
+              <a:gd name="connsiteX1" fmla="*/ 14068 w 1575582"/>
+              <a:gd name="connsiteY1" fmla="*/ 1048043 h 1364566"/>
+              <a:gd name="connsiteX2" fmla="*/ 1568548 w 1575582"/>
+              <a:gd name="connsiteY2" fmla="*/ 1364566 h 1364566"/>
+              <a:gd name="connsiteX3" fmla="*/ 1575582 w 1575582"/>
+              <a:gd name="connsiteY3" fmla="*/ 14068 h 1364566"/>
+              <a:gd name="connsiteX4" fmla="*/ 0 w 1575582"/>
+              <a:gd name="connsiteY4" fmla="*/ 0 h 1364566"/>
+            </a:gdLst>
+            <a:ahLst/>
+            <a:cxnLst>
+              <a:cxn ang="0">
+                <a:pos x="connsiteX0" y="connsiteY0"/>
+              </a:cxn>
+              <a:cxn ang="0">
+                <a:pos x="connsiteX1" y="connsiteY1"/>
+              </a:cxn>
+              <a:cxn ang="0">
+                <a:pos x="connsiteX2" y="connsiteY2"/>
+              </a:cxn>
+              <a:cxn ang="0">
+                <a:pos x="connsiteX3" y="connsiteY3"/>
+              </a:cxn>
+              <a:cxn ang="0">
+                <a:pos x="connsiteX4" y="connsiteY4"/>
+              </a:cxn>
+            </a:cxnLst>
+            <a:rect l="l" t="t" r="r" b="b"/>
+            <a:pathLst>
+              <a:path w="1575582" h="1364566">
+                <a:moveTo>
+                  <a:pt x="0" y="0"/>
+                </a:moveTo>
+                <a:lnTo>
+                  <a:pt x="14068" y="1048043"/>
+                </a:lnTo>
+                <a:lnTo>
+                  <a:pt x="1568548" y="1364566"/>
+                </a:lnTo>
+                <a:cubicBezTo>
+                  <a:pt x="1570893" y="914400"/>
+                  <a:pt x="1573237" y="464234"/>
+                  <a:pt x="1575582" y="14068"/>
+                </a:cubicBezTo>
+                <a:lnTo>
+                  <a:pt x="0" y="0"/>
+                </a:lnTo>
+                <a:close/>
+              </a:path>
+            </a:pathLst>
+          </a:custGeom>
+          <a:solidFill>
+            <a:schemeClr val="accent1">
+              <a:alpha val="27000"/>
+            </a:schemeClr>
+          </a:solidFill>
+        </p:spPr>
+        <p:style>
+          <a:lnRef idx="2">
+            <a:schemeClr val="accent1">
+              <a:shade val="15000"/>
+            </a:schemeClr>
+          </a:lnRef>
+          <a:fillRef idx="1">
+            <a:schemeClr val="accent1"/>
+          </a:fillRef>
+          <a:effectRef idx="0">
+            <a:schemeClr val="accent1"/>
+          </a:effectRef>
+          <a:fontRef idx="minor">
+            <a:schemeClr val="lt1"/>
+          </a:fontRef>
+        </p:style>
+        <p:txBody>
+          <a:bodyPr rtlCol="0" anchor="ctr"/>
+          <a:lstStyle/>
+          <a:p>
+            <a:pPr algn="ctr"/>
+            <a:endParaRPr lang="en-CA"/>
+          </a:p>
+        </p:txBody>
+      </p:sp>
+      <p:sp>
+        <p:nvSpPr>
+          <p:cNvPr id="9" name="Arrow: Right 8">
+            <a:extLst>
+              <a:ext uri="{FF2B5EF4-FFF2-40B4-BE49-F238E27FC236}">
+                <a16:creationId xmlns:a16="http://schemas.microsoft.com/office/drawing/2014/main" id="{A319C90E-A661-197D-E9BB-B13B52139101}"/>
+              </a:ext>
+            </a:extLst>
+          </p:cNvPr>
+          <p:cNvSpPr/>
+          <p:nvPr/>
+        </p:nvSpPr>
+        <p:spPr>
+          <a:xfrm rot="19469608">
+            <a:off x="6059921" y="2164518"/>
+            <a:ext cx="838200" cy="381000"/>
+          </a:xfrm>
+          <a:prstGeom prst="rightArrow">
+            <a:avLst/>
+          </a:prstGeom>
+          <a:solidFill>
+            <a:schemeClr val="accent1">
+              <a:alpha val="27000"/>
+            </a:schemeClr>
+          </a:solidFill>
+        </p:spPr>
+        <p:style>
+          <a:lnRef idx="2">
+            <a:schemeClr val="accent1">
+              <a:shade val="15000"/>
+            </a:schemeClr>
+          </a:lnRef>
+          <a:fillRef idx="1">
+            <a:schemeClr val="accent1"/>
+          </a:fillRef>
+          <a:effectRef idx="0">
+            <a:schemeClr val="accent1"/>
+          </a:effectRef>
+          <a:fontRef idx="minor">
+            <a:schemeClr val="lt1"/>
+          </a:fontRef>
+        </p:style>
+        <p:txBody>
+          <a:bodyPr rtlCol="0" anchor="ctr"/>
+          <a:lstStyle/>
+          <a:p>
+            <a:pPr algn="ctr"/>
+            <a:endParaRPr lang="en-CA"/>
+          </a:p>
+        </p:txBody>
+      </p:sp>
+    </p:spTree>
+    <p:extLst>
+      <p:ext uri="{BB962C8B-B14F-4D97-AF65-F5344CB8AC3E}">
+        <p14:creationId xmlns:p14="http://schemas.microsoft.com/office/powerpoint/2010/main" val="4183226344"/>
       </p:ext>
     </p:extLst>
   </p:cSld>

</xml_diff>

<commit_message>
Deferred showing the vertex colour, but on a large viper that's larger than the current view
</commit_message>
<xml_diff>
--- a/6020_Graph_2_(2025)/Day2Day/Week_08_Deferred_Rendering_1/Deferred_lighting.pptx
+++ b/6020_Graph_2_(2025)/Day2Day/Week_08_Deferred_Rendering_1/Deferred_lighting.pptx
@@ -5,7 +5,7 @@
     <p:sldMasterId id="2147483732" r:id="rId1"/>
   </p:sldMasterIdLst>
   <p:notesMasterIdLst>
-    <p:notesMasterId r:id="rId17"/>
+    <p:notesMasterId r:id="rId25"/>
   </p:notesMasterIdLst>
   <p:sldIdLst>
     <p:sldId id="460" r:id="rId2"/>
@@ -23,6 +23,14 @@
     <p:sldId id="472" r:id="rId14"/>
     <p:sldId id="473" r:id="rId15"/>
     <p:sldId id="475" r:id="rId16"/>
+    <p:sldId id="476" r:id="rId17"/>
+    <p:sldId id="477" r:id="rId18"/>
+    <p:sldId id="479" r:id="rId19"/>
+    <p:sldId id="478" r:id="rId20"/>
+    <p:sldId id="481" r:id="rId21"/>
+    <p:sldId id="480" r:id="rId22"/>
+    <p:sldId id="482" r:id="rId23"/>
+    <p:sldId id="483" r:id="rId24"/>
   </p:sldIdLst>
   <p:sldSz cx="9144000" cy="5143500" type="screen16x9"/>
   <p:notesSz cx="7315200" cy="9601200"/>
@@ -5218,7 +5226,7 @@
         </p:nvSpPr>
         <p:spPr>
           <a:xfrm>
-            <a:off x="3543300" y="2038350"/>
+            <a:off x="3562350" y="1581150"/>
             <a:ext cx="2019300" cy="1477328"/>
           </a:xfrm>
           <a:prstGeom prst="rect">
@@ -5413,6 +5421,863 @@
 </p:sld>
 </file>
 
+<file path=ppt/slides/slide16.xml><?xml version="1.0" encoding="utf-8"?>
+<p:sld xmlns:a="http://schemas.openxmlformats.org/drawingml/2006/main" xmlns:r="http://schemas.openxmlformats.org/officeDocument/2006/relationships" xmlns:p="http://schemas.openxmlformats.org/presentationml/2006/main">
+  <p:cSld>
+    <p:spTree>
+      <p:nvGrpSpPr>
+        <p:cNvPr id="1" name=""/>
+        <p:cNvGrpSpPr/>
+        <p:nvPr/>
+      </p:nvGrpSpPr>
+      <p:grpSpPr>
+        <a:xfrm>
+          <a:off x="0" y="0"/>
+          <a:ext cx="0" cy="0"/>
+          <a:chOff x="0" y="0"/>
+          <a:chExt cx="0" cy="0"/>
+        </a:xfrm>
+      </p:grpSpPr>
+      <p:pic>
+        <p:nvPicPr>
+          <p:cNvPr id="6" name="Picture 5">
+            <a:extLst>
+              <a:ext uri="{FF2B5EF4-FFF2-40B4-BE49-F238E27FC236}">
+                <a16:creationId xmlns:a16="http://schemas.microsoft.com/office/drawing/2014/main" id="{806C3594-D30F-8771-C884-8E7B84997297}"/>
+              </a:ext>
+            </a:extLst>
+          </p:cNvPr>
+          <p:cNvPicPr>
+            <a:picLocks noChangeAspect="1"/>
+          </p:cNvPicPr>
+          <p:nvPr/>
+        </p:nvPicPr>
+        <p:blipFill>
+          <a:blip r:embed="rId2"/>
+          <a:stretch>
+            <a:fillRect/>
+          </a:stretch>
+        </p:blipFill>
+        <p:spPr>
+          <a:xfrm>
+            <a:off x="0" y="142875"/>
+            <a:ext cx="9144000" cy="4857750"/>
+          </a:xfrm>
+          <a:prstGeom prst="rect">
+            <a:avLst/>
+          </a:prstGeom>
+        </p:spPr>
+      </p:pic>
+    </p:spTree>
+    <p:extLst>
+      <p:ext uri="{BB962C8B-B14F-4D97-AF65-F5344CB8AC3E}">
+        <p14:creationId xmlns:p14="http://schemas.microsoft.com/office/powerpoint/2010/main" val="3447697439"/>
+      </p:ext>
+    </p:extLst>
+  </p:cSld>
+  <p:clrMapOvr>
+    <a:masterClrMapping/>
+  </p:clrMapOvr>
+</p:sld>
+</file>
+
+<file path=ppt/slides/slide17.xml><?xml version="1.0" encoding="utf-8"?>
+<p:sld xmlns:a="http://schemas.openxmlformats.org/drawingml/2006/main" xmlns:r="http://schemas.openxmlformats.org/officeDocument/2006/relationships" xmlns:p="http://schemas.openxmlformats.org/presentationml/2006/main">
+  <p:cSld>
+    <p:spTree>
+      <p:nvGrpSpPr>
+        <p:cNvPr id="1" name=""/>
+        <p:cNvGrpSpPr/>
+        <p:nvPr/>
+      </p:nvGrpSpPr>
+      <p:grpSpPr>
+        <a:xfrm>
+          <a:off x="0" y="0"/>
+          <a:ext cx="0" cy="0"/>
+          <a:chOff x="0" y="0"/>
+          <a:chExt cx="0" cy="0"/>
+        </a:xfrm>
+      </p:grpSpPr>
+      <p:pic>
+        <p:nvPicPr>
+          <p:cNvPr id="3" name="Picture 2">
+            <a:extLst>
+              <a:ext uri="{FF2B5EF4-FFF2-40B4-BE49-F238E27FC236}">
+                <a16:creationId xmlns:a16="http://schemas.microsoft.com/office/drawing/2014/main" id="{73E4C463-A358-353B-835A-CEE6B8192E36}"/>
+              </a:ext>
+            </a:extLst>
+          </p:cNvPr>
+          <p:cNvPicPr>
+            <a:picLocks noChangeAspect="1"/>
+          </p:cNvPicPr>
+          <p:nvPr/>
+        </p:nvPicPr>
+        <p:blipFill>
+          <a:blip r:embed="rId2"/>
+          <a:stretch>
+            <a:fillRect/>
+          </a:stretch>
+        </p:blipFill>
+        <p:spPr>
+          <a:xfrm>
+            <a:off x="0" y="142875"/>
+            <a:ext cx="9144000" cy="4857750"/>
+          </a:xfrm>
+          <a:prstGeom prst="rect">
+            <a:avLst/>
+          </a:prstGeom>
+        </p:spPr>
+      </p:pic>
+      <p:sp>
+        <p:nvSpPr>
+          <p:cNvPr id="5" name="Rectangle: Rounded Corners 4">
+            <a:extLst>
+              <a:ext uri="{FF2B5EF4-FFF2-40B4-BE49-F238E27FC236}">
+                <a16:creationId xmlns:a16="http://schemas.microsoft.com/office/drawing/2014/main" id="{D59EBA9A-007C-2542-5BAD-37DB608FCFF5}"/>
+              </a:ext>
+            </a:extLst>
+          </p:cNvPr>
+          <p:cNvSpPr/>
+          <p:nvPr/>
+        </p:nvSpPr>
+        <p:spPr>
+          <a:xfrm>
+            <a:off x="76200" y="361950"/>
+            <a:ext cx="5715000" cy="838200"/>
+          </a:xfrm>
+          <a:prstGeom prst="roundRect">
+            <a:avLst/>
+          </a:prstGeom>
+        </p:spPr>
+        <p:style>
+          <a:lnRef idx="2">
+            <a:schemeClr val="accent1">
+              <a:shade val="15000"/>
+            </a:schemeClr>
+          </a:lnRef>
+          <a:fillRef idx="1">
+            <a:schemeClr val="accent1"/>
+          </a:fillRef>
+          <a:effectRef idx="0">
+            <a:schemeClr val="accent1"/>
+          </a:effectRef>
+          <a:fontRef idx="minor">
+            <a:schemeClr val="lt1"/>
+          </a:fontRef>
+        </p:style>
+        <p:txBody>
+          <a:bodyPr rtlCol="0" anchor="ctr"/>
+          <a:lstStyle/>
+          <a:p>
+            <a:pPr algn="ctr"/>
+            <a:r>
+              <a:rPr lang="en-CA" dirty="0">
+                <a:solidFill>
+                  <a:schemeClr val="tx1"/>
+                </a:solidFill>
+              </a:rPr>
+              <a:t>Here the 1</a:t>
+            </a:r>
+            <a:r>
+              <a:rPr lang="en-CA" baseline="30000" dirty="0">
+                <a:solidFill>
+                  <a:schemeClr val="tx1"/>
+                </a:solidFill>
+              </a:rPr>
+              <a:t>st</a:t>
+            </a:r>
+            <a:r>
+              <a:rPr lang="en-CA" dirty="0">
+                <a:solidFill>
+                  <a:schemeClr val="tx1"/>
+                </a:solidFill>
+              </a:rPr>
+              <a:t> pass is being shown on the viper model, but it’s using the Vipers UV coordinates, so it’s distorted…</a:t>
+            </a:r>
+          </a:p>
+        </p:txBody>
+      </p:sp>
+      <p:sp>
+        <p:nvSpPr>
+          <p:cNvPr id="7" name="Rectangle: Rounded Corners 6">
+            <a:extLst>
+              <a:ext uri="{FF2B5EF4-FFF2-40B4-BE49-F238E27FC236}">
+                <a16:creationId xmlns:a16="http://schemas.microsoft.com/office/drawing/2014/main" id="{8E25E5A7-F122-6C1F-29BF-A2ADD7C2435F}"/>
+              </a:ext>
+            </a:extLst>
+          </p:cNvPr>
+          <p:cNvSpPr/>
+          <p:nvPr/>
+        </p:nvSpPr>
+        <p:spPr>
+          <a:xfrm>
+            <a:off x="2933700" y="3790950"/>
+            <a:ext cx="5715000" cy="838200"/>
+          </a:xfrm>
+          <a:prstGeom prst="roundRect">
+            <a:avLst/>
+          </a:prstGeom>
+        </p:spPr>
+        <p:style>
+          <a:lnRef idx="2">
+            <a:schemeClr val="accent1">
+              <a:shade val="15000"/>
+            </a:schemeClr>
+          </a:lnRef>
+          <a:fillRef idx="1">
+            <a:schemeClr val="accent1"/>
+          </a:fillRef>
+          <a:effectRef idx="0">
+            <a:schemeClr val="accent1"/>
+          </a:effectRef>
+          <a:fontRef idx="minor">
+            <a:schemeClr val="lt1"/>
+          </a:fontRef>
+        </p:style>
+        <p:txBody>
+          <a:bodyPr rtlCol="0" anchor="ctr"/>
+          <a:lstStyle/>
+          <a:p>
+            <a:pPr algn="ctr"/>
+            <a:r>
+              <a:rPr lang="en-CA" dirty="0">
+                <a:solidFill>
+                  <a:schemeClr val="tx1"/>
+                </a:solidFill>
+              </a:rPr>
+              <a:t>But you can move the mouse around and do all the things you did with the forward rendering pass</a:t>
+            </a:r>
+          </a:p>
+        </p:txBody>
+      </p:sp>
+    </p:spTree>
+    <p:extLst>
+      <p:ext uri="{BB962C8B-B14F-4D97-AF65-F5344CB8AC3E}">
+        <p14:creationId xmlns:p14="http://schemas.microsoft.com/office/powerpoint/2010/main" val="533079560"/>
+      </p:ext>
+    </p:extLst>
+  </p:cSld>
+  <p:clrMapOvr>
+    <a:masterClrMapping/>
+  </p:clrMapOvr>
+</p:sld>
+</file>
+
+<file path=ppt/slides/slide18.xml><?xml version="1.0" encoding="utf-8"?>
+<p:sld xmlns:a="http://schemas.openxmlformats.org/drawingml/2006/main" xmlns:r="http://schemas.openxmlformats.org/officeDocument/2006/relationships" xmlns:p="http://schemas.openxmlformats.org/presentationml/2006/main">
+  <p:cSld>
+    <p:spTree>
+      <p:nvGrpSpPr>
+        <p:cNvPr id="1" name=""/>
+        <p:cNvGrpSpPr/>
+        <p:nvPr/>
+      </p:nvGrpSpPr>
+      <p:grpSpPr>
+        <a:xfrm>
+          <a:off x="0" y="0"/>
+          <a:ext cx="0" cy="0"/>
+          <a:chOff x="0" y="0"/>
+          <a:chExt cx="0" cy="0"/>
+        </a:xfrm>
+      </p:grpSpPr>
+      <p:sp>
+        <p:nvSpPr>
+          <p:cNvPr id="2" name="Title 1">
+            <a:extLst>
+              <a:ext uri="{FF2B5EF4-FFF2-40B4-BE49-F238E27FC236}">
+                <a16:creationId xmlns:a16="http://schemas.microsoft.com/office/drawing/2014/main" id="{7D420759-A2D4-72C0-837F-9665A1882570}"/>
+              </a:ext>
+            </a:extLst>
+          </p:cNvPr>
+          <p:cNvSpPr>
+            <a:spLocks noGrp="1"/>
+          </p:cNvSpPr>
+          <p:nvPr>
+            <p:ph type="title"/>
+          </p:nvPr>
+        </p:nvSpPr>
+        <p:spPr/>
+        <p:txBody>
+          <a:bodyPr/>
+          <a:lstStyle/>
+          <a:p>
+            <a:r>
+              <a:rPr lang="en-CA" dirty="0"/>
+              <a:t>Using the actual pixel locations</a:t>
+            </a:r>
+          </a:p>
+        </p:txBody>
+      </p:sp>
+      <p:sp>
+        <p:nvSpPr>
+          <p:cNvPr id="3" name="Content Placeholder 2">
+            <a:extLst>
+              <a:ext uri="{FF2B5EF4-FFF2-40B4-BE49-F238E27FC236}">
+                <a16:creationId xmlns:a16="http://schemas.microsoft.com/office/drawing/2014/main" id="{0AF4EE83-5030-97B3-86A9-A9A2DD4184E6}"/>
+              </a:ext>
+            </a:extLst>
+          </p:cNvPr>
+          <p:cNvSpPr>
+            <a:spLocks noGrp="1"/>
+          </p:cNvSpPr>
+          <p:nvPr>
+            <p:ph idx="1"/>
+          </p:nvPr>
+        </p:nvSpPr>
+        <p:spPr>
+          <a:xfrm>
+            <a:off x="152400" y="1200150"/>
+            <a:ext cx="8896643" cy="3657600"/>
+          </a:xfrm>
+        </p:spPr>
+        <p:txBody>
+          <a:bodyPr>
+            <a:noAutofit/>
+          </a:bodyPr>
+          <a:lstStyle/>
+          <a:p>
+            <a:pPr marL="118872" indent="0">
+              <a:buNone/>
+            </a:pPr>
+            <a:r>
+              <a:rPr lang="en-CA" sz="2000" dirty="0">
+                <a:latin typeface="Arial" panose="020B0604020202020204" pitchFamily="34" charset="0"/>
+                <a:cs typeface="Arial" panose="020B0604020202020204" pitchFamily="34" charset="0"/>
+              </a:rPr>
+              <a:t>The 'catch' is the </a:t>
+            </a:r>
+            <a:r>
+              <a:rPr lang="en-CA" sz="2000" dirty="0" err="1">
+                <a:latin typeface="Arial" panose="020B0604020202020204" pitchFamily="34" charset="0"/>
+                <a:cs typeface="Arial" panose="020B0604020202020204" pitchFamily="34" charset="0"/>
+              </a:rPr>
+              <a:t>gl_FragCoord.xy</a:t>
+            </a:r>
+            <a:r>
+              <a:rPr lang="en-CA" sz="2000" dirty="0">
+                <a:latin typeface="Arial" panose="020B0604020202020204" pitchFamily="34" charset="0"/>
+                <a:cs typeface="Arial" panose="020B0604020202020204" pitchFamily="34" charset="0"/>
+              </a:rPr>
+              <a:t> is pixel locations, not 0.0 to 1.0</a:t>
+            </a:r>
+          </a:p>
+          <a:p>
+            <a:pPr marL="118872" indent="0">
+              <a:buNone/>
+            </a:pPr>
+            <a:r>
+              <a:rPr lang="en-CA" sz="2000" dirty="0">
+                <a:latin typeface="Arial" panose="020B0604020202020204" pitchFamily="34" charset="0"/>
+                <a:cs typeface="Arial" panose="020B0604020202020204" pitchFamily="34" charset="0"/>
+              </a:rPr>
+              <a:t>We'll use the: uniform vec2 </a:t>
+            </a:r>
+            <a:r>
+              <a:rPr lang="en-CA" sz="2000" dirty="0" err="1">
+                <a:latin typeface="Arial" panose="020B0604020202020204" pitchFamily="34" charset="0"/>
+                <a:cs typeface="Arial" panose="020B0604020202020204" pitchFamily="34" charset="0"/>
+              </a:rPr>
+              <a:t>screenSize_width_height</a:t>
+            </a:r>
+            <a:r>
+              <a:rPr lang="en-CA" sz="2000" dirty="0">
+                <a:latin typeface="Arial" panose="020B0604020202020204" pitchFamily="34" charset="0"/>
+                <a:cs typeface="Arial" panose="020B0604020202020204" pitchFamily="34" charset="0"/>
+              </a:rPr>
+              <a:t>  to calculate the UV sampler values:</a:t>
+            </a:r>
+          </a:p>
+          <a:p>
+            <a:pPr marL="118872" indent="0">
+              <a:buNone/>
+            </a:pPr>
+            <a:r>
+              <a:rPr lang="en-CA" sz="1600" b="1" dirty="0">
+                <a:latin typeface="Courier New" panose="02070309020205020404" pitchFamily="49" charset="0"/>
+                <a:cs typeface="Courier New" panose="02070309020205020404" pitchFamily="49" charset="0"/>
+              </a:rPr>
+              <a:t>vec2 </a:t>
+            </a:r>
+            <a:r>
+              <a:rPr lang="en-CA" sz="1600" b="1" u="sng" dirty="0" err="1">
+                <a:highlight>
+                  <a:srgbClr val="FFFF00"/>
+                </a:highlight>
+                <a:latin typeface="Courier New" panose="02070309020205020404" pitchFamily="49" charset="0"/>
+                <a:cs typeface="Courier New" panose="02070309020205020404" pitchFamily="49" charset="0"/>
+              </a:rPr>
+              <a:t>screenUV</a:t>
+            </a:r>
+            <a:r>
+              <a:rPr lang="en-CA" sz="1600" b="1" dirty="0">
+                <a:latin typeface="Courier New" panose="02070309020205020404" pitchFamily="49" charset="0"/>
+                <a:cs typeface="Courier New" panose="02070309020205020404" pitchFamily="49" charset="0"/>
+              </a:rPr>
+              <a:t> = vec2( </a:t>
+            </a:r>
+            <a:r>
+              <a:rPr lang="en-CA" sz="1600" b="1" dirty="0" err="1">
+                <a:latin typeface="Courier New" panose="02070309020205020404" pitchFamily="49" charset="0"/>
+                <a:cs typeface="Courier New" panose="02070309020205020404" pitchFamily="49" charset="0"/>
+              </a:rPr>
+              <a:t>gl_FragCoord.x</a:t>
+            </a:r>
+            <a:r>
+              <a:rPr lang="en-CA" sz="1600" b="1" dirty="0">
+                <a:latin typeface="Courier New" panose="02070309020205020404" pitchFamily="49" charset="0"/>
+                <a:cs typeface="Courier New" panose="02070309020205020404" pitchFamily="49" charset="0"/>
+              </a:rPr>
+              <a:t> / </a:t>
+            </a:r>
+            <a:r>
+              <a:rPr lang="en-CA" sz="1600" b="1" dirty="0" err="1">
+                <a:latin typeface="Courier New" panose="02070309020205020404" pitchFamily="49" charset="0"/>
+                <a:cs typeface="Courier New" panose="02070309020205020404" pitchFamily="49" charset="0"/>
+              </a:rPr>
+              <a:t>screenSize_width_height.x</a:t>
+            </a:r>
+            <a:r>
+              <a:rPr lang="en-CA" sz="1600" b="1" dirty="0">
+                <a:latin typeface="Courier New" panose="02070309020205020404" pitchFamily="49" charset="0"/>
+                <a:cs typeface="Courier New" panose="02070309020205020404" pitchFamily="49" charset="0"/>
+              </a:rPr>
+              <a:t>, </a:t>
+            </a:r>
+          </a:p>
+          <a:p>
+            <a:pPr marL="118872" indent="0">
+              <a:buNone/>
+            </a:pPr>
+            <a:r>
+              <a:rPr lang="en-CA" sz="1600" b="1" dirty="0">
+                <a:latin typeface="Courier New" panose="02070309020205020404" pitchFamily="49" charset="0"/>
+                <a:cs typeface="Courier New" panose="02070309020205020404" pitchFamily="49" charset="0"/>
+              </a:rPr>
+              <a:t>	               </a:t>
+            </a:r>
+            <a:r>
+              <a:rPr lang="en-CA" sz="1600" b="1" dirty="0" err="1">
+                <a:latin typeface="Courier New" panose="02070309020205020404" pitchFamily="49" charset="0"/>
+                <a:cs typeface="Courier New" panose="02070309020205020404" pitchFamily="49" charset="0"/>
+              </a:rPr>
+              <a:t>gl_FragCoord.y</a:t>
+            </a:r>
+            <a:r>
+              <a:rPr lang="en-CA" sz="1600" b="1" dirty="0">
+                <a:latin typeface="Courier New" panose="02070309020205020404" pitchFamily="49" charset="0"/>
+                <a:cs typeface="Courier New" panose="02070309020205020404" pitchFamily="49" charset="0"/>
+              </a:rPr>
+              <a:t> / </a:t>
+            </a:r>
+            <a:r>
+              <a:rPr lang="en-CA" sz="1600" b="1" dirty="0" err="1">
+                <a:latin typeface="Courier New" panose="02070309020205020404" pitchFamily="49" charset="0"/>
+                <a:cs typeface="Courier New" panose="02070309020205020404" pitchFamily="49" charset="0"/>
+              </a:rPr>
+              <a:t>screenSize_width_height.y</a:t>
+            </a:r>
+            <a:r>
+              <a:rPr lang="en-CA" sz="1600" b="1" dirty="0">
+                <a:latin typeface="Courier New" panose="02070309020205020404" pitchFamily="49" charset="0"/>
+                <a:cs typeface="Courier New" panose="02070309020205020404" pitchFamily="49" charset="0"/>
+              </a:rPr>
+              <a:t> );</a:t>
+            </a:r>
+          </a:p>
+          <a:p>
+            <a:pPr marL="118872" indent="0">
+              <a:buNone/>
+            </a:pPr>
+            <a:r>
+              <a:rPr lang="en-CA" sz="2000" i="1" dirty="0">
+                <a:latin typeface="Arial" panose="020B0604020202020204" pitchFamily="34" charset="0"/>
+                <a:cs typeface="Arial" panose="020B0604020202020204" pitchFamily="34" charset="0"/>
+              </a:rPr>
+              <a:t>(note the “</a:t>
+            </a:r>
+            <a:r>
+              <a:rPr lang="en-CA" sz="2000" i="1" dirty="0" err="1">
+                <a:latin typeface="Arial" panose="020B0604020202020204" pitchFamily="34" charset="0"/>
+                <a:cs typeface="Arial" panose="020B0604020202020204" pitchFamily="34" charset="0"/>
+              </a:rPr>
+              <a:t>fradment</a:t>
+            </a:r>
+            <a:r>
+              <a:rPr lang="en-CA" sz="2000" i="1" dirty="0">
+                <a:latin typeface="Arial" panose="020B0604020202020204" pitchFamily="34" charset="0"/>
+                <a:cs typeface="Arial" panose="020B0604020202020204" pitchFamily="34" charset="0"/>
+              </a:rPr>
+              <a:t> coordinate” is in pixel location (integer)</a:t>
+            </a:r>
+          </a:p>
+          <a:p>
+            <a:pPr marL="118872" indent="0">
+              <a:buNone/>
+            </a:pPr>
+            <a:r>
+              <a:rPr lang="en-CA" sz="2000" dirty="0">
+                <a:latin typeface="Arial" panose="020B0604020202020204" pitchFamily="34" charset="0"/>
+                <a:cs typeface="Arial" panose="020B0604020202020204" pitchFamily="34" charset="0"/>
+              </a:rPr>
+              <a:t>Get the vertex colour from the 1st pass</a:t>
+            </a:r>
+          </a:p>
+          <a:p>
+            <a:pPr marL="118872" indent="0">
+              <a:buNone/>
+            </a:pPr>
+            <a:r>
+              <a:rPr lang="en-CA" sz="2000" dirty="0">
+                <a:latin typeface="Arial" panose="020B0604020202020204" pitchFamily="34" charset="0"/>
+                <a:cs typeface="Arial" panose="020B0604020202020204" pitchFamily="34" charset="0"/>
+              </a:rPr>
+              <a:t>Note this:</a:t>
+            </a:r>
+          </a:p>
+          <a:p>
+            <a:pPr marL="118872" indent="0">
+              <a:buNone/>
+            </a:pPr>
+            <a:r>
+              <a:rPr lang="en-CA" sz="1600" b="1" dirty="0">
+                <a:latin typeface="Courier New" panose="02070309020205020404" pitchFamily="49" charset="0"/>
+                <a:cs typeface="Courier New" panose="02070309020205020404" pitchFamily="49" charset="0"/>
+              </a:rPr>
+              <a:t>    vec3 </a:t>
+            </a:r>
+            <a:r>
+              <a:rPr lang="en-CA" sz="1600" b="1" dirty="0" err="1">
+                <a:latin typeface="Courier New" panose="02070309020205020404" pitchFamily="49" charset="0"/>
+                <a:cs typeface="Courier New" panose="02070309020205020404" pitchFamily="49" charset="0"/>
+              </a:rPr>
+              <a:t>vertexDiffuseRGB</a:t>
+            </a:r>
+            <a:r>
+              <a:rPr lang="en-CA" sz="1600" b="1" dirty="0">
+                <a:latin typeface="Courier New" panose="02070309020205020404" pitchFamily="49" charset="0"/>
+                <a:cs typeface="Courier New" panose="02070309020205020404" pitchFamily="49" charset="0"/>
+              </a:rPr>
+              <a:t> </a:t>
+            </a:r>
+            <a:br>
+              <a:rPr lang="en-CA" sz="1600" b="1" dirty="0">
+                <a:latin typeface="Courier New" panose="02070309020205020404" pitchFamily="49" charset="0"/>
+                <a:cs typeface="Courier New" panose="02070309020205020404" pitchFamily="49" charset="0"/>
+              </a:rPr>
+            </a:br>
+            <a:r>
+              <a:rPr lang="en-CA" sz="1600" b="1" dirty="0">
+                <a:latin typeface="Courier New" panose="02070309020205020404" pitchFamily="49" charset="0"/>
+                <a:cs typeface="Courier New" panose="02070309020205020404" pitchFamily="49" charset="0"/>
+              </a:rPr>
+              <a:t>           = texture( </a:t>
+            </a:r>
+            <a:r>
+              <a:rPr lang="en-CA" sz="1600" b="1" dirty="0" err="1">
+                <a:latin typeface="Courier New" panose="02070309020205020404" pitchFamily="49" charset="0"/>
+                <a:cs typeface="Courier New" panose="02070309020205020404" pitchFamily="49" charset="0"/>
+              </a:rPr>
+              <a:t>vertexDiffuseRGB_texture</a:t>
+            </a:r>
+            <a:r>
+              <a:rPr lang="en-CA" sz="1600" b="1" dirty="0">
+                <a:latin typeface="Courier New" panose="02070309020205020404" pitchFamily="49" charset="0"/>
+                <a:cs typeface="Courier New" panose="02070309020205020404" pitchFamily="49" charset="0"/>
+              </a:rPr>
+              <a:t>, fUV.st ).</a:t>
+            </a:r>
+            <a:r>
+              <a:rPr lang="en-CA" sz="1600" b="1" dirty="0" err="1">
+                <a:latin typeface="Courier New" panose="02070309020205020404" pitchFamily="49" charset="0"/>
+                <a:cs typeface="Courier New" panose="02070309020205020404" pitchFamily="49" charset="0"/>
+              </a:rPr>
+              <a:t>rgb</a:t>
+            </a:r>
+            <a:r>
+              <a:rPr lang="en-CA" sz="1600" b="1" dirty="0">
+                <a:latin typeface="Courier New" panose="02070309020205020404" pitchFamily="49" charset="0"/>
+                <a:cs typeface="Courier New" panose="02070309020205020404" pitchFamily="49" charset="0"/>
+              </a:rPr>
+              <a:t>;</a:t>
+            </a:r>
+          </a:p>
+          <a:p>
+            <a:pPr marL="118872" indent="0">
+              <a:buNone/>
+            </a:pPr>
+            <a:r>
+              <a:rPr lang="en-CA" sz="2000" dirty="0">
+                <a:latin typeface="Arial" panose="020B0604020202020204" pitchFamily="34" charset="0"/>
+                <a:cs typeface="Arial" panose="020B0604020202020204" pitchFamily="34" charset="0"/>
+              </a:rPr>
+              <a:t>But this:</a:t>
+            </a:r>
+          </a:p>
+          <a:p>
+            <a:pPr marL="118872" indent="0">
+              <a:buNone/>
+            </a:pPr>
+            <a:r>
+              <a:rPr lang="en-CA" sz="1600" b="1" dirty="0">
+                <a:latin typeface="Courier New" panose="02070309020205020404" pitchFamily="49" charset="0"/>
+                <a:cs typeface="Courier New" panose="02070309020205020404" pitchFamily="49" charset="0"/>
+              </a:rPr>
+              <a:t>    vec3 </a:t>
+            </a:r>
+            <a:r>
+              <a:rPr lang="en-CA" sz="1600" b="1" dirty="0" err="1">
+                <a:latin typeface="Courier New" panose="02070309020205020404" pitchFamily="49" charset="0"/>
+                <a:cs typeface="Courier New" panose="02070309020205020404" pitchFamily="49" charset="0"/>
+              </a:rPr>
+              <a:t>vertexDiffuseRGB</a:t>
+            </a:r>
+            <a:r>
+              <a:rPr lang="en-CA" sz="1600" b="1" dirty="0">
+                <a:latin typeface="Courier New" panose="02070309020205020404" pitchFamily="49" charset="0"/>
+                <a:cs typeface="Courier New" panose="02070309020205020404" pitchFamily="49" charset="0"/>
+              </a:rPr>
+              <a:t> </a:t>
+            </a:r>
+            <a:br>
+              <a:rPr lang="en-CA" sz="1600" b="1" dirty="0">
+                <a:latin typeface="Courier New" panose="02070309020205020404" pitchFamily="49" charset="0"/>
+                <a:cs typeface="Courier New" panose="02070309020205020404" pitchFamily="49" charset="0"/>
+              </a:rPr>
+            </a:br>
+            <a:r>
+              <a:rPr lang="en-CA" sz="1600" b="1" dirty="0">
+                <a:latin typeface="Courier New" panose="02070309020205020404" pitchFamily="49" charset="0"/>
+                <a:cs typeface="Courier New" panose="02070309020205020404" pitchFamily="49" charset="0"/>
+              </a:rPr>
+              <a:t>          = texture( </a:t>
+            </a:r>
+            <a:r>
+              <a:rPr lang="en-CA" sz="1600" b="1" dirty="0" err="1">
+                <a:latin typeface="Courier New" panose="02070309020205020404" pitchFamily="49" charset="0"/>
+                <a:cs typeface="Courier New" panose="02070309020205020404" pitchFamily="49" charset="0"/>
+              </a:rPr>
+              <a:t>vertexDiffuseRGB_texture</a:t>
+            </a:r>
+            <a:r>
+              <a:rPr lang="en-CA" sz="1600" b="1" dirty="0">
+                <a:latin typeface="Courier New" panose="02070309020205020404" pitchFamily="49" charset="0"/>
+                <a:cs typeface="Courier New" panose="02070309020205020404" pitchFamily="49" charset="0"/>
+              </a:rPr>
+              <a:t>, </a:t>
+            </a:r>
+            <a:r>
+              <a:rPr lang="en-CA" sz="1600" b="1" u="sng" dirty="0">
+                <a:highlight>
+                  <a:srgbClr val="FFFF00"/>
+                </a:highlight>
+                <a:latin typeface="Courier New" panose="02070309020205020404" pitchFamily="49" charset="0"/>
+                <a:cs typeface="Courier New" panose="02070309020205020404" pitchFamily="49" charset="0"/>
+              </a:rPr>
+              <a:t>screenUV.st</a:t>
+            </a:r>
+            <a:r>
+              <a:rPr lang="en-CA" sz="1600" b="1" dirty="0">
+                <a:latin typeface="Courier New" panose="02070309020205020404" pitchFamily="49" charset="0"/>
+                <a:cs typeface="Courier New" panose="02070309020205020404" pitchFamily="49" charset="0"/>
+              </a:rPr>
+              <a:t> ).</a:t>
+            </a:r>
+            <a:r>
+              <a:rPr lang="en-CA" sz="1600" b="1" dirty="0" err="1">
+                <a:latin typeface="Courier New" panose="02070309020205020404" pitchFamily="49" charset="0"/>
+                <a:cs typeface="Courier New" panose="02070309020205020404" pitchFamily="49" charset="0"/>
+              </a:rPr>
+              <a:t>rgb</a:t>
+            </a:r>
+            <a:r>
+              <a:rPr lang="en-CA" sz="1600" b="1" dirty="0">
+                <a:latin typeface="Courier New" panose="02070309020205020404" pitchFamily="49" charset="0"/>
+                <a:cs typeface="Courier New" panose="02070309020205020404" pitchFamily="49" charset="0"/>
+              </a:rPr>
+              <a:t>;</a:t>
+            </a:r>
+          </a:p>
+        </p:txBody>
+      </p:sp>
+    </p:spTree>
+    <p:extLst>
+      <p:ext uri="{BB962C8B-B14F-4D97-AF65-F5344CB8AC3E}">
+        <p14:creationId xmlns:p14="http://schemas.microsoft.com/office/powerpoint/2010/main" val="396590143"/>
+      </p:ext>
+    </p:extLst>
+  </p:cSld>
+  <p:clrMapOvr>
+    <a:masterClrMapping/>
+  </p:clrMapOvr>
+</p:sld>
+</file>
+
+<file path=ppt/slides/slide19.xml><?xml version="1.0" encoding="utf-8"?>
+<p:sld xmlns:a="http://schemas.openxmlformats.org/drawingml/2006/main" xmlns:r="http://schemas.openxmlformats.org/officeDocument/2006/relationships" xmlns:p="http://schemas.openxmlformats.org/presentationml/2006/main">
+  <p:cSld>
+    <p:spTree>
+      <p:nvGrpSpPr>
+        <p:cNvPr id="1" name=""/>
+        <p:cNvGrpSpPr/>
+        <p:nvPr/>
+      </p:nvGrpSpPr>
+      <p:grpSpPr>
+        <a:xfrm>
+          <a:off x="0" y="0"/>
+          <a:ext cx="0" cy="0"/>
+          <a:chOff x="0" y="0"/>
+          <a:chExt cx="0" cy="0"/>
+        </a:xfrm>
+      </p:grpSpPr>
+      <p:pic>
+        <p:nvPicPr>
+          <p:cNvPr id="4" name="Picture 3">
+            <a:extLst>
+              <a:ext uri="{FF2B5EF4-FFF2-40B4-BE49-F238E27FC236}">
+                <a16:creationId xmlns:a16="http://schemas.microsoft.com/office/drawing/2014/main" id="{DB186D88-5482-05B4-0640-734874562CD6}"/>
+              </a:ext>
+            </a:extLst>
+          </p:cNvPr>
+          <p:cNvPicPr>
+            <a:picLocks noChangeAspect="1"/>
+          </p:cNvPicPr>
+          <p:nvPr/>
+        </p:nvPicPr>
+        <p:blipFill>
+          <a:blip r:embed="rId2"/>
+          <a:stretch>
+            <a:fillRect/>
+          </a:stretch>
+        </p:blipFill>
+        <p:spPr>
+          <a:xfrm>
+            <a:off x="0" y="142875"/>
+            <a:ext cx="9144000" cy="4857750"/>
+          </a:xfrm>
+          <a:prstGeom prst="rect">
+            <a:avLst/>
+          </a:prstGeom>
+        </p:spPr>
+      </p:pic>
+      <p:sp>
+        <p:nvSpPr>
+          <p:cNvPr id="5" name="Rectangle: Rounded Corners 4">
+            <a:extLst>
+              <a:ext uri="{FF2B5EF4-FFF2-40B4-BE49-F238E27FC236}">
+                <a16:creationId xmlns:a16="http://schemas.microsoft.com/office/drawing/2014/main" id="{D59EBA9A-007C-2542-5BAD-37DB608FCFF5}"/>
+              </a:ext>
+            </a:extLst>
+          </p:cNvPr>
+          <p:cNvSpPr/>
+          <p:nvPr/>
+        </p:nvSpPr>
+        <p:spPr>
+          <a:xfrm>
+            <a:off x="76200" y="361950"/>
+            <a:ext cx="5715000" cy="838200"/>
+          </a:xfrm>
+          <a:prstGeom prst="roundRect">
+            <a:avLst/>
+          </a:prstGeom>
+        </p:spPr>
+        <p:style>
+          <a:lnRef idx="2">
+            <a:schemeClr val="accent1">
+              <a:shade val="15000"/>
+            </a:schemeClr>
+          </a:lnRef>
+          <a:fillRef idx="1">
+            <a:schemeClr val="accent1"/>
+          </a:fillRef>
+          <a:effectRef idx="0">
+            <a:schemeClr val="accent1"/>
+          </a:effectRef>
+          <a:fontRef idx="minor">
+            <a:schemeClr val="lt1"/>
+          </a:fontRef>
+        </p:style>
+        <p:txBody>
+          <a:bodyPr rtlCol="0" anchor="ctr"/>
+          <a:lstStyle/>
+          <a:p>
+            <a:pPr algn="ctr"/>
+            <a:r>
+              <a:rPr lang="en-CA" dirty="0">
+                <a:solidFill>
+                  <a:schemeClr val="tx1"/>
+                </a:solidFill>
+              </a:rPr>
+              <a:t>The scene is now like we are looking through a “viper shaped” window</a:t>
+            </a:r>
+          </a:p>
+        </p:txBody>
+      </p:sp>
+      <p:sp>
+        <p:nvSpPr>
+          <p:cNvPr id="7" name="Rectangle: Rounded Corners 6">
+            <a:extLst>
+              <a:ext uri="{FF2B5EF4-FFF2-40B4-BE49-F238E27FC236}">
+                <a16:creationId xmlns:a16="http://schemas.microsoft.com/office/drawing/2014/main" id="{8E25E5A7-F122-6C1F-29BF-A2ADD7C2435F}"/>
+              </a:ext>
+            </a:extLst>
+          </p:cNvPr>
+          <p:cNvSpPr/>
+          <p:nvPr/>
+        </p:nvSpPr>
+        <p:spPr>
+          <a:xfrm>
+            <a:off x="2933700" y="3790950"/>
+            <a:ext cx="5715000" cy="838200"/>
+          </a:xfrm>
+          <a:prstGeom prst="roundRect">
+            <a:avLst/>
+          </a:prstGeom>
+        </p:spPr>
+        <p:style>
+          <a:lnRef idx="2">
+            <a:schemeClr val="accent1">
+              <a:shade val="15000"/>
+            </a:schemeClr>
+          </a:lnRef>
+          <a:fillRef idx="1">
+            <a:schemeClr val="accent1"/>
+          </a:fillRef>
+          <a:effectRef idx="0">
+            <a:schemeClr val="accent1"/>
+          </a:effectRef>
+          <a:fontRef idx="minor">
+            <a:schemeClr val="lt1"/>
+          </a:fontRef>
+        </p:style>
+        <p:txBody>
+          <a:bodyPr rtlCol="0" anchor="ctr"/>
+          <a:lstStyle/>
+          <a:p>
+            <a:pPr algn="ctr"/>
+            <a:r>
+              <a:rPr lang="en-CA" dirty="0">
+                <a:solidFill>
+                  <a:schemeClr val="tx1"/>
+                </a:solidFill>
+              </a:rPr>
+              <a:t>It’s NOT using the viper model UV, but the screen coordinates</a:t>
+            </a:r>
+          </a:p>
+        </p:txBody>
+      </p:sp>
+    </p:spTree>
+    <p:extLst>
+      <p:ext uri="{BB962C8B-B14F-4D97-AF65-F5344CB8AC3E}">
+        <p14:creationId xmlns:p14="http://schemas.microsoft.com/office/powerpoint/2010/main" val="4196443072"/>
+      </p:ext>
+    </p:extLst>
+  </p:cSld>
+  <p:clrMapOvr>
+    <a:masterClrMapping/>
+  </p:clrMapOvr>
+</p:sld>
+</file>
+
 <file path=ppt/slides/slide2.xml><?xml version="1.0" encoding="utf-8"?>
 <p:sld xmlns:a="http://schemas.openxmlformats.org/drawingml/2006/main" xmlns:r="http://schemas.openxmlformats.org/officeDocument/2006/relationships" xmlns:p="http://schemas.openxmlformats.org/presentationml/2006/main">
   <p:cSld>
@@ -5518,6 +6383,561 @@
     <p:extLst>
       <p:ext uri="{BB962C8B-B14F-4D97-AF65-F5344CB8AC3E}">
         <p14:creationId xmlns:p14="http://schemas.microsoft.com/office/powerpoint/2010/main" val="41387832"/>
+      </p:ext>
+    </p:extLst>
+  </p:cSld>
+  <p:clrMapOvr>
+    <a:masterClrMapping/>
+  </p:clrMapOvr>
+</p:sld>
+</file>
+
+<file path=ppt/slides/slide20.xml><?xml version="1.0" encoding="utf-8"?>
+<p:sld xmlns:a="http://schemas.openxmlformats.org/drawingml/2006/main" xmlns:r="http://schemas.openxmlformats.org/officeDocument/2006/relationships" xmlns:p="http://schemas.openxmlformats.org/presentationml/2006/main">
+  <p:cSld>
+    <p:spTree>
+      <p:nvGrpSpPr>
+        <p:cNvPr id="1" name=""/>
+        <p:cNvGrpSpPr/>
+        <p:nvPr/>
+      </p:nvGrpSpPr>
+      <p:grpSpPr>
+        <a:xfrm>
+          <a:off x="0" y="0"/>
+          <a:ext cx="0" cy="0"/>
+          <a:chOff x="0" y="0"/>
+          <a:chExt cx="0" cy="0"/>
+        </a:xfrm>
+      </p:grpSpPr>
+      <p:pic>
+        <p:nvPicPr>
+          <p:cNvPr id="4" name="Picture 3">
+            <a:extLst>
+              <a:ext uri="{FF2B5EF4-FFF2-40B4-BE49-F238E27FC236}">
+                <a16:creationId xmlns:a16="http://schemas.microsoft.com/office/drawing/2014/main" id="{DB186D88-5482-05B4-0640-734874562CD6}"/>
+              </a:ext>
+            </a:extLst>
+          </p:cNvPr>
+          <p:cNvPicPr>
+            <a:picLocks noChangeAspect="1"/>
+          </p:cNvPicPr>
+          <p:nvPr/>
+        </p:nvPicPr>
+        <p:blipFill>
+          <a:blip r:embed="rId2"/>
+          <a:stretch>
+            <a:fillRect/>
+          </a:stretch>
+        </p:blipFill>
+        <p:spPr>
+          <a:xfrm>
+            <a:off x="0" y="142875"/>
+            <a:ext cx="9144000" cy="4857750"/>
+          </a:xfrm>
+          <a:prstGeom prst="rect">
+            <a:avLst/>
+          </a:prstGeom>
+        </p:spPr>
+      </p:pic>
+      <p:sp>
+        <p:nvSpPr>
+          <p:cNvPr id="5" name="Rectangle: Rounded Corners 4">
+            <a:extLst>
+              <a:ext uri="{FF2B5EF4-FFF2-40B4-BE49-F238E27FC236}">
+                <a16:creationId xmlns:a16="http://schemas.microsoft.com/office/drawing/2014/main" id="{D59EBA9A-007C-2542-5BAD-37DB608FCFF5}"/>
+              </a:ext>
+            </a:extLst>
+          </p:cNvPr>
+          <p:cNvSpPr/>
+          <p:nvPr/>
+        </p:nvSpPr>
+        <p:spPr>
+          <a:xfrm>
+            <a:off x="76200" y="361950"/>
+            <a:ext cx="5715000" cy="838200"/>
+          </a:xfrm>
+          <a:prstGeom prst="roundRect">
+            <a:avLst/>
+          </a:prstGeom>
+        </p:spPr>
+        <p:style>
+          <a:lnRef idx="2">
+            <a:schemeClr val="accent1">
+              <a:shade val="15000"/>
+            </a:schemeClr>
+          </a:lnRef>
+          <a:fillRef idx="1">
+            <a:schemeClr val="accent1"/>
+          </a:fillRef>
+          <a:effectRef idx="0">
+            <a:schemeClr val="accent1"/>
+          </a:effectRef>
+          <a:fontRef idx="minor">
+            <a:schemeClr val="lt1"/>
+          </a:fontRef>
+        </p:style>
+        <p:txBody>
+          <a:bodyPr rtlCol="0" anchor="ctr"/>
+          <a:lstStyle/>
+          <a:p>
+            <a:pPr algn="ctr"/>
+            <a:r>
+              <a:rPr lang="en-CA" dirty="0">
+                <a:solidFill>
+                  <a:schemeClr val="tx1"/>
+                </a:solidFill>
+              </a:rPr>
+              <a:t>Note that the black area is where the fragment shader DOESN’T run (is black because of the clear screen colour)</a:t>
+            </a:r>
+          </a:p>
+        </p:txBody>
+      </p:sp>
+      <p:sp>
+        <p:nvSpPr>
+          <p:cNvPr id="2" name="Rectangle: Rounded Corners 1">
+            <a:extLst>
+              <a:ext uri="{FF2B5EF4-FFF2-40B4-BE49-F238E27FC236}">
+                <a16:creationId xmlns:a16="http://schemas.microsoft.com/office/drawing/2014/main" id="{21C0348D-9260-FFCC-BE43-5E705B856940}"/>
+              </a:ext>
+            </a:extLst>
+          </p:cNvPr>
+          <p:cNvSpPr/>
+          <p:nvPr/>
+        </p:nvSpPr>
+        <p:spPr>
+          <a:xfrm>
+            <a:off x="381000" y="3962986"/>
+            <a:ext cx="8313420" cy="838200"/>
+          </a:xfrm>
+          <a:prstGeom prst="roundRect">
+            <a:avLst/>
+          </a:prstGeom>
+        </p:spPr>
+        <p:style>
+          <a:lnRef idx="2">
+            <a:schemeClr val="accent1">
+              <a:shade val="15000"/>
+            </a:schemeClr>
+          </a:lnRef>
+          <a:fillRef idx="1">
+            <a:schemeClr val="accent1"/>
+          </a:fillRef>
+          <a:effectRef idx="0">
+            <a:schemeClr val="accent1"/>
+          </a:effectRef>
+          <a:fontRef idx="minor">
+            <a:schemeClr val="lt1"/>
+          </a:fontRef>
+        </p:style>
+        <p:txBody>
+          <a:bodyPr rtlCol="0" anchor="ctr"/>
+          <a:lstStyle/>
+          <a:p>
+            <a:pPr algn="ctr"/>
+            <a:r>
+              <a:rPr lang="en-CA" dirty="0">
+                <a:solidFill>
+                  <a:schemeClr val="tx1"/>
+                </a:solidFill>
+              </a:rPr>
+              <a:t>This means we can know EXACTLY how many times we call the fragment shader and it’s consistent on this pass (it’s not consistent with forward rendering because we don’t know how many times the fragment shader will be called in the original scene)</a:t>
+            </a:r>
+          </a:p>
+        </p:txBody>
+      </p:sp>
+    </p:spTree>
+    <p:extLst>
+      <p:ext uri="{BB962C8B-B14F-4D97-AF65-F5344CB8AC3E}">
+        <p14:creationId xmlns:p14="http://schemas.microsoft.com/office/powerpoint/2010/main" val="3818621070"/>
+      </p:ext>
+    </p:extLst>
+  </p:cSld>
+  <p:clrMapOvr>
+    <a:masterClrMapping/>
+  </p:clrMapOvr>
+</p:sld>
+</file>
+
+<file path=ppt/slides/slide21.xml><?xml version="1.0" encoding="utf-8"?>
+<p:sld xmlns:a="http://schemas.openxmlformats.org/drawingml/2006/main" xmlns:r="http://schemas.openxmlformats.org/officeDocument/2006/relationships" xmlns:p="http://schemas.openxmlformats.org/presentationml/2006/main">
+  <p:cSld>
+    <p:spTree>
+      <p:nvGrpSpPr>
+        <p:cNvPr id="1" name=""/>
+        <p:cNvGrpSpPr/>
+        <p:nvPr/>
+      </p:nvGrpSpPr>
+      <p:grpSpPr>
+        <a:xfrm>
+          <a:off x="0" y="0"/>
+          <a:ext cx="0" cy="0"/>
+          <a:chOff x="0" y="0"/>
+          <a:chExt cx="0" cy="0"/>
+        </a:xfrm>
+      </p:grpSpPr>
+      <p:pic>
+        <p:nvPicPr>
+          <p:cNvPr id="3" name="Picture 2">
+            <a:extLst>
+              <a:ext uri="{FF2B5EF4-FFF2-40B4-BE49-F238E27FC236}">
+                <a16:creationId xmlns:a16="http://schemas.microsoft.com/office/drawing/2014/main" id="{FF2CE77A-3E1C-BFAD-FBDE-7FDCE705BFEC}"/>
+              </a:ext>
+            </a:extLst>
+          </p:cNvPr>
+          <p:cNvPicPr>
+            <a:picLocks noChangeAspect="1"/>
+          </p:cNvPicPr>
+          <p:nvPr/>
+        </p:nvPicPr>
+        <p:blipFill>
+          <a:blip r:embed="rId2"/>
+          <a:stretch>
+            <a:fillRect/>
+          </a:stretch>
+        </p:blipFill>
+        <p:spPr>
+          <a:xfrm>
+            <a:off x="0" y="142875"/>
+            <a:ext cx="9144000" cy="4857750"/>
+          </a:xfrm>
+          <a:prstGeom prst="rect">
+            <a:avLst/>
+          </a:prstGeom>
+        </p:spPr>
+      </p:pic>
+      <p:sp>
+        <p:nvSpPr>
+          <p:cNvPr id="5" name="Rectangle: Rounded Corners 4">
+            <a:extLst>
+              <a:ext uri="{FF2B5EF4-FFF2-40B4-BE49-F238E27FC236}">
+                <a16:creationId xmlns:a16="http://schemas.microsoft.com/office/drawing/2014/main" id="{D59EBA9A-007C-2542-5BAD-37DB608FCFF5}"/>
+              </a:ext>
+            </a:extLst>
+          </p:cNvPr>
+          <p:cNvSpPr/>
+          <p:nvPr/>
+        </p:nvSpPr>
+        <p:spPr>
+          <a:xfrm>
+            <a:off x="76200" y="361950"/>
+            <a:ext cx="5715000" cy="838200"/>
+          </a:xfrm>
+          <a:prstGeom prst="roundRect">
+            <a:avLst/>
+          </a:prstGeom>
+        </p:spPr>
+        <p:style>
+          <a:lnRef idx="2">
+            <a:schemeClr val="accent1">
+              <a:shade val="15000"/>
+            </a:schemeClr>
+          </a:lnRef>
+          <a:fillRef idx="1">
+            <a:schemeClr val="accent1"/>
+          </a:fillRef>
+          <a:effectRef idx="0">
+            <a:schemeClr val="accent1"/>
+          </a:effectRef>
+          <a:fontRef idx="minor">
+            <a:schemeClr val="lt1"/>
+          </a:fontRef>
+        </p:style>
+        <p:txBody>
+          <a:bodyPr rtlCol="0" anchor="ctr"/>
+          <a:lstStyle/>
+          <a:p>
+            <a:pPr algn="ctr"/>
+            <a:r>
+              <a:rPr lang="en-CA" dirty="0">
+                <a:solidFill>
+                  <a:schemeClr val="tx1"/>
+                </a:solidFill>
+              </a:rPr>
+              <a:t>This is STILL the Viper model, but it’s very large, taking up the entire screen…</a:t>
+            </a:r>
+          </a:p>
+        </p:txBody>
+      </p:sp>
+    </p:spTree>
+    <p:extLst>
+      <p:ext uri="{BB962C8B-B14F-4D97-AF65-F5344CB8AC3E}">
+        <p14:creationId xmlns:p14="http://schemas.microsoft.com/office/powerpoint/2010/main" val="3008939227"/>
+      </p:ext>
+    </p:extLst>
+  </p:cSld>
+  <p:clrMapOvr>
+    <a:masterClrMapping/>
+  </p:clrMapOvr>
+</p:sld>
+</file>
+
+<file path=ppt/slides/slide22.xml><?xml version="1.0" encoding="utf-8"?>
+<p:sld xmlns:a="http://schemas.openxmlformats.org/drawingml/2006/main" xmlns:r="http://schemas.openxmlformats.org/officeDocument/2006/relationships" xmlns:p="http://schemas.openxmlformats.org/presentationml/2006/main">
+  <p:cSld>
+    <p:spTree>
+      <p:nvGrpSpPr>
+        <p:cNvPr id="1" name=""/>
+        <p:cNvGrpSpPr/>
+        <p:nvPr/>
+      </p:nvGrpSpPr>
+      <p:grpSpPr>
+        <a:xfrm>
+          <a:off x="0" y="0"/>
+          <a:ext cx="0" cy="0"/>
+          <a:chOff x="0" y="0"/>
+          <a:chExt cx="0" cy="0"/>
+        </a:xfrm>
+      </p:grpSpPr>
+      <p:sp>
+        <p:nvSpPr>
+          <p:cNvPr id="2" name="Title 1">
+            <a:extLst>
+              <a:ext uri="{FF2B5EF4-FFF2-40B4-BE49-F238E27FC236}">
+                <a16:creationId xmlns:a16="http://schemas.microsoft.com/office/drawing/2014/main" id="{7D420759-A2D4-72C0-837F-9665A1882570}"/>
+              </a:ext>
+            </a:extLst>
+          </p:cNvPr>
+          <p:cNvSpPr>
+            <a:spLocks noGrp="1"/>
+          </p:cNvSpPr>
+          <p:nvPr>
+            <p:ph type="title"/>
+          </p:nvPr>
+        </p:nvSpPr>
+        <p:spPr/>
+        <p:txBody>
+          <a:bodyPr/>
+          <a:lstStyle/>
+          <a:p>
+            <a:r>
+              <a:rPr lang="en-CA" dirty="0"/>
+              <a:t>“Full Screen Quad”</a:t>
+            </a:r>
+          </a:p>
+        </p:txBody>
+      </p:sp>
+      <p:sp>
+        <p:nvSpPr>
+          <p:cNvPr id="3" name="Content Placeholder 2">
+            <a:extLst>
+              <a:ext uri="{FF2B5EF4-FFF2-40B4-BE49-F238E27FC236}">
+                <a16:creationId xmlns:a16="http://schemas.microsoft.com/office/drawing/2014/main" id="{0AF4EE83-5030-97B3-86A9-A9A2DD4184E6}"/>
+              </a:ext>
+            </a:extLst>
+          </p:cNvPr>
+          <p:cNvSpPr>
+            <a:spLocks noGrp="1"/>
+          </p:cNvSpPr>
+          <p:nvPr>
+            <p:ph idx="1"/>
+          </p:nvPr>
+        </p:nvSpPr>
+        <p:spPr>
+          <a:xfrm>
+            <a:off x="152400" y="1200150"/>
+            <a:ext cx="8896643" cy="3657600"/>
+          </a:xfrm>
+        </p:spPr>
+        <p:txBody>
+          <a:bodyPr>
+            <a:noAutofit/>
+          </a:bodyPr>
+          <a:lstStyle/>
+          <a:p>
+            <a:r>
+              <a:rPr lang="en-CA" sz="2000" dirty="0">
+                <a:latin typeface="Arial" panose="020B0604020202020204" pitchFamily="34" charset="0"/>
+                <a:cs typeface="Arial" panose="020B0604020202020204" pitchFamily="34" charset="0"/>
+              </a:rPr>
+              <a:t>There’s no point in drawing the viper as our “full screen” mesh</a:t>
+            </a:r>
+          </a:p>
+          <a:p>
+            <a:r>
+              <a:rPr lang="en-CA" sz="2000" dirty="0">
+                <a:latin typeface="Arial" panose="020B0604020202020204" pitchFamily="34" charset="0"/>
+                <a:cs typeface="Arial" panose="020B0604020202020204" pitchFamily="34" charset="0"/>
+              </a:rPr>
+              <a:t>Often, we’ll refer to a “full screen quad” that covers the entire scene in the last pass, but:</a:t>
+            </a:r>
+          </a:p>
+          <a:p>
+            <a:pPr lvl="1"/>
+            <a:r>
+              <a:rPr lang="en-CA" sz="1600" dirty="0">
+                <a:latin typeface="Arial" panose="020B0604020202020204" pitchFamily="34" charset="0"/>
+                <a:cs typeface="Arial" panose="020B0604020202020204" pitchFamily="34" charset="0"/>
+              </a:rPr>
+              <a:t>We can use anything (like a Viper!)</a:t>
+            </a:r>
+          </a:p>
+          <a:p>
+            <a:pPr lvl="1"/>
+            <a:r>
+              <a:rPr lang="en-CA" sz="1600" dirty="0">
+                <a:latin typeface="Arial" panose="020B0604020202020204" pitchFamily="34" charset="0"/>
+                <a:cs typeface="Arial" panose="020B0604020202020204" pitchFamily="34" charset="0"/>
+              </a:rPr>
+              <a:t>Or a single triangle? (recommended by </a:t>
+            </a:r>
+            <a:r>
+              <a:rPr lang="en-CA" sz="1600" dirty="0" err="1">
+                <a:latin typeface="Arial" panose="020B0604020202020204" pitchFamily="34" charset="0"/>
+                <a:cs typeface="Arial" panose="020B0604020202020204" pitchFamily="34" charset="0"/>
+              </a:rPr>
+              <a:t>nVidia</a:t>
+            </a:r>
+            <a:r>
+              <a:rPr lang="en-CA" sz="1600" dirty="0">
+                <a:latin typeface="Arial" panose="020B0604020202020204" pitchFamily="34" charset="0"/>
+                <a:cs typeface="Arial" panose="020B0604020202020204" pitchFamily="34" charset="0"/>
+              </a:rPr>
+              <a:t> and AMD, actually)</a:t>
+            </a:r>
+          </a:p>
+          <a:p>
+            <a:r>
+              <a:rPr lang="en-CA" sz="2000" dirty="0">
+                <a:latin typeface="Arial" panose="020B0604020202020204" pitchFamily="34" charset="0"/>
+                <a:cs typeface="Arial" panose="020B0604020202020204" pitchFamily="34" charset="0"/>
+              </a:rPr>
+              <a:t>We’ll use a two triangle mesh, though (as it’s a “quad”)</a:t>
+            </a:r>
+          </a:p>
+          <a:p>
+            <a:endParaRPr lang="en-CA" sz="2000" dirty="0">
+              <a:latin typeface="Arial" panose="020B0604020202020204" pitchFamily="34" charset="0"/>
+              <a:cs typeface="Arial" panose="020B0604020202020204" pitchFamily="34" charset="0"/>
+            </a:endParaRPr>
+          </a:p>
+          <a:p>
+            <a:r>
+              <a:rPr lang="en-CA" sz="2000" dirty="0">
+                <a:latin typeface="Arial" panose="020B0604020202020204" pitchFamily="34" charset="0"/>
+                <a:cs typeface="Arial" panose="020B0604020202020204" pitchFamily="34" charset="0"/>
+              </a:rPr>
+              <a:t>Keep this idea that we can use whatever shape we want to control when the fragment shader runs as it’ll come up with “light volumes” – i.e. we will draw a specific light in the scene and use a specific shape that matches where we want that light to go (like spot light cones, “god rays”, etc.)</a:t>
+            </a:r>
+          </a:p>
+        </p:txBody>
+      </p:sp>
+    </p:spTree>
+    <p:extLst>
+      <p:ext uri="{BB962C8B-B14F-4D97-AF65-F5344CB8AC3E}">
+        <p14:creationId xmlns:p14="http://schemas.microsoft.com/office/powerpoint/2010/main" val="1994674393"/>
+      </p:ext>
+    </p:extLst>
+  </p:cSld>
+  <p:clrMapOvr>
+    <a:masterClrMapping/>
+  </p:clrMapOvr>
+</p:sld>
+</file>
+
+<file path=ppt/slides/slide23.xml><?xml version="1.0" encoding="utf-8"?>
+<p:sld xmlns:a="http://schemas.openxmlformats.org/drawingml/2006/main" xmlns:r="http://schemas.openxmlformats.org/officeDocument/2006/relationships" xmlns:p="http://schemas.openxmlformats.org/presentationml/2006/main">
+  <p:cSld>
+    <p:spTree>
+      <p:nvGrpSpPr>
+        <p:cNvPr id="1" name=""/>
+        <p:cNvGrpSpPr/>
+        <p:nvPr/>
+      </p:nvGrpSpPr>
+      <p:grpSpPr>
+        <a:xfrm>
+          <a:off x="0" y="0"/>
+          <a:ext cx="0" cy="0"/>
+          <a:chOff x="0" y="0"/>
+          <a:chExt cx="0" cy="0"/>
+        </a:xfrm>
+      </p:grpSpPr>
+      <p:pic>
+        <p:nvPicPr>
+          <p:cNvPr id="4" name="Picture 3">
+            <a:extLst>
+              <a:ext uri="{FF2B5EF4-FFF2-40B4-BE49-F238E27FC236}">
+                <a16:creationId xmlns:a16="http://schemas.microsoft.com/office/drawing/2014/main" id="{FDAF96CA-D68B-8625-3510-763809FC7ED0}"/>
+              </a:ext>
+            </a:extLst>
+          </p:cNvPr>
+          <p:cNvPicPr>
+            <a:picLocks noChangeAspect="1"/>
+          </p:cNvPicPr>
+          <p:nvPr/>
+        </p:nvPicPr>
+        <p:blipFill>
+          <a:blip r:embed="rId2"/>
+          <a:stretch>
+            <a:fillRect/>
+          </a:stretch>
+        </p:blipFill>
+        <p:spPr>
+          <a:xfrm>
+            <a:off x="0" y="142875"/>
+            <a:ext cx="9144000" cy="4857750"/>
+          </a:xfrm>
+          <a:prstGeom prst="rect">
+            <a:avLst/>
+          </a:prstGeom>
+        </p:spPr>
+      </p:pic>
+      <p:sp>
+        <p:nvSpPr>
+          <p:cNvPr id="5" name="Rectangle: Rounded Corners 4">
+            <a:extLst>
+              <a:ext uri="{FF2B5EF4-FFF2-40B4-BE49-F238E27FC236}">
+                <a16:creationId xmlns:a16="http://schemas.microsoft.com/office/drawing/2014/main" id="{D59EBA9A-007C-2542-5BAD-37DB608FCFF5}"/>
+              </a:ext>
+            </a:extLst>
+          </p:cNvPr>
+          <p:cNvSpPr/>
+          <p:nvPr/>
+        </p:nvSpPr>
+        <p:spPr>
+          <a:xfrm>
+            <a:off x="76200" y="361950"/>
+            <a:ext cx="5562600" cy="609600"/>
+          </a:xfrm>
+          <a:prstGeom prst="roundRect">
+            <a:avLst/>
+          </a:prstGeom>
+        </p:spPr>
+        <p:style>
+          <a:lnRef idx="2">
+            <a:schemeClr val="accent1">
+              <a:shade val="15000"/>
+            </a:schemeClr>
+          </a:lnRef>
+          <a:fillRef idx="1">
+            <a:schemeClr val="accent1"/>
+          </a:fillRef>
+          <a:effectRef idx="0">
+            <a:schemeClr val="accent1"/>
+          </a:effectRef>
+          <a:fontRef idx="minor">
+            <a:schemeClr val="lt1"/>
+          </a:fontRef>
+        </p:style>
+        <p:txBody>
+          <a:bodyPr rtlCol="0" anchor="ctr"/>
+          <a:lstStyle/>
+          <a:p>
+            <a:pPr algn="ctr"/>
+            <a:r>
+              <a:rPr lang="en-CA" dirty="0">
+                <a:solidFill>
+                  <a:schemeClr val="tx1"/>
+                </a:solidFill>
+              </a:rPr>
+              <a:t>Here’s the “full screen quad” model we’ll use...</a:t>
+            </a:r>
+          </a:p>
+        </p:txBody>
+      </p:sp>
+    </p:spTree>
+    <p:extLst>
+      <p:ext uri="{BB962C8B-B14F-4D97-AF65-F5344CB8AC3E}">
+        <p14:creationId xmlns:p14="http://schemas.microsoft.com/office/powerpoint/2010/main" val="3705679838"/>
       </p:ext>
     </p:extLst>
   </p:cSld>

</xml_diff>

<commit_message>
Added empty stub function for 2nd pass effect in fragment shader
</commit_message>
<xml_diff>
--- a/6020_Graph_2_(2025)/Day2Day/Week_08_Deferred_Rendering_1/Deferred_lighting.pptx
+++ b/6020_Graph_2_(2025)/Day2Day/Week_08_Deferred_Rendering_1/Deferred_lighting.pptx
@@ -4677,7 +4677,7 @@
           <p:nvPr>
             <p:extLst>
               <p:ext uri="{D42A27DB-BD31-4B8C-83A1-F6EECF244321}">
-                <p14:modId xmlns:p14="http://schemas.microsoft.com/office/powerpoint/2010/main" val="822255029"/>
+                <p14:modId xmlns:p14="http://schemas.microsoft.com/office/powerpoint/2010/main" val="3910186122"/>
               </p:ext>
             </p:extLst>
           </p:nvPr>
@@ -4725,6 +4725,72 @@
           </a:graphicData>
         </a:graphic>
       </p:graphicFrame>
+      <p:sp>
+        <p:nvSpPr>
+          <p:cNvPr id="9" name="TextBox 8">
+            <a:extLst>
+              <a:ext uri="{FF2B5EF4-FFF2-40B4-BE49-F238E27FC236}">
+                <a16:creationId xmlns:a16="http://schemas.microsoft.com/office/drawing/2014/main" id="{1E7C6066-DC7C-B220-0E20-1944BFBCFE11}"/>
+              </a:ext>
+            </a:extLst>
+          </p:cNvPr>
+          <p:cNvSpPr txBox="1"/>
+          <p:nvPr/>
+        </p:nvSpPr>
+        <p:spPr>
+          <a:xfrm>
+            <a:off x="533400" y="3943350"/>
+            <a:ext cx="5173852" cy="369332"/>
+          </a:xfrm>
+          <a:prstGeom prst="rect">
+            <a:avLst/>
+          </a:prstGeom>
+          <a:noFill/>
+        </p:spPr>
+        <p:txBody>
+          <a:bodyPr wrap="none" rtlCol="0">
+            <a:spAutoFit/>
+          </a:bodyPr>
+          <a:lstStyle/>
+          <a:p>
+            <a:r>
+              <a:rPr lang="en-CA" dirty="0">
+                <a:latin typeface="Arial" panose="020B0604020202020204" pitchFamily="34" charset="0"/>
+                <a:cs typeface="Arial" panose="020B0604020202020204" pitchFamily="34" charset="0"/>
+              </a:rPr>
+              <a:t>“w” of normal = 0 </a:t>
+            </a:r>
+            <a:r>
+              <a:rPr lang="en-CA" dirty="0">
+                <a:latin typeface="Arial" panose="020B0604020202020204" pitchFamily="34" charset="0"/>
+                <a:cs typeface="Arial" panose="020B0604020202020204" pitchFamily="34" charset="0"/>
+                <a:sym typeface="Wingdings" panose="05000000000000000000" pitchFamily="2" charset="2"/>
+              </a:rPr>
+              <a:t> NOT lit on 2</a:t>
+            </a:r>
+            <a:r>
+              <a:rPr lang="en-CA" baseline="30000" dirty="0">
+                <a:latin typeface="Arial" panose="020B0604020202020204" pitchFamily="34" charset="0"/>
+                <a:cs typeface="Arial" panose="020B0604020202020204" pitchFamily="34" charset="0"/>
+                <a:sym typeface="Wingdings" panose="05000000000000000000" pitchFamily="2" charset="2"/>
+              </a:rPr>
+              <a:t>nd</a:t>
+            </a:r>
+            <a:r>
+              <a:rPr lang="en-CA" dirty="0">
+                <a:latin typeface="Arial" panose="020B0604020202020204" pitchFamily="34" charset="0"/>
+                <a:cs typeface="Arial" panose="020B0604020202020204" pitchFamily="34" charset="0"/>
+                <a:sym typeface="Wingdings" panose="05000000000000000000" pitchFamily="2" charset="2"/>
+              </a:rPr>
+              <a:t> (lighting) pass</a:t>
+            </a:r>
+            <a:endParaRPr lang="en-CA" dirty="0">
+              <a:latin typeface="Arial" panose="020B0604020202020204" pitchFamily="34" charset="0"/>
+              <a:cs typeface="Arial" panose="020B0604020202020204" pitchFamily="34" charset="0"/>
+            </a:endParaRPr>
+          </a:p>
+        </p:txBody>
+      </p:sp>
     </p:spTree>
     <p:extLst>
       <p:ext uri="{BB962C8B-B14F-4D97-AF65-F5344CB8AC3E}">

</xml_diff>